<commit_message>
BCs are change from close to active
</commit_message>
<xml_diff>
--- a/stm/documents/EWRI_2011/full_test_package_ADR.pptx
+++ b/stm/documents/EWRI_2011/full_test_package_ADR.pptx
@@ -4739,7 +4739,15 @@
         <a:p>
           <a:r>
             <a:rPr lang="en-US" sz="1200" dirty="0" smtClean="0"/>
-            <a:t>Linear Flow Field Close BC</a:t>
+            <a:t>Linear Flow Field </a:t>
+          </a:r>
+          <a:r>
+            <a:rPr lang="en-US" sz="1200" dirty="0" smtClean="0"/>
+            <a:t>Active </a:t>
+          </a:r>
+          <a:r>
+            <a:rPr lang="en-US" sz="1200" dirty="0" smtClean="0"/>
+            <a:t>BC</a:t>
           </a:r>
           <a:endParaRPr lang="en-US" sz="1200" dirty="0"/>
         </a:p>
@@ -4932,6 +4940,13 @@
         </dgm:presLayoutVars>
       </dgm:prSet>
       <dgm:spPr/>
+      <dgm:t>
+        <a:bodyPr/>
+        <a:lstStyle/>
+        <a:p>
+          <a:endParaRPr lang="en-US"/>
+        </a:p>
+      </dgm:t>
     </dgm:pt>
     <dgm:pt modelId="{0B34A907-D616-41BD-ABB5-FFD2A4AD9FC0}" type="pres">
       <dgm:prSet presAssocID="{B6CF3427-DE35-49D4-8AE6-E8505ACF0A22}" presName="compositeNode" presStyleCnt="0">
@@ -4944,6 +4959,13 @@
     <dgm:pt modelId="{F154D92C-8AFE-4A13-9C4A-945DDA5332D5}" type="pres">
       <dgm:prSet presAssocID="{B6CF3427-DE35-49D4-8AE6-E8505ACF0A22}" presName="bgRect" presStyleLbl="node1" presStyleIdx="0" presStyleCnt="4"/>
       <dgm:spPr/>
+      <dgm:t>
+        <a:bodyPr/>
+        <a:lstStyle/>
+        <a:p>
+          <a:endParaRPr lang="en-US"/>
+        </a:p>
+      </dgm:t>
     </dgm:pt>
     <dgm:pt modelId="{32987979-9A1A-4366-AD61-07DBB5852CB5}" type="pres">
       <dgm:prSet presAssocID="{B6CF3427-DE35-49D4-8AE6-E8505ACF0A22}" presName="parentNode" presStyleLbl="node1" presStyleIdx="0" presStyleCnt="4">
@@ -4953,6 +4975,13 @@
         </dgm:presLayoutVars>
       </dgm:prSet>
       <dgm:spPr/>
+      <dgm:t>
+        <a:bodyPr/>
+        <a:lstStyle/>
+        <a:p>
+          <a:endParaRPr lang="en-US"/>
+        </a:p>
+      </dgm:t>
     </dgm:pt>
     <dgm:pt modelId="{B01EA3BF-ADC4-4E7A-B35F-0E1BB6C7EBDE}" type="pres">
       <dgm:prSet presAssocID="{B6CF3427-DE35-49D4-8AE6-E8505ACF0A22}" presName="childNode" presStyleLbl="node1" presStyleIdx="0" presStyleCnt="4">
@@ -5090,6 +5119,13 @@
     <dgm:pt modelId="{9FF9C7A6-A450-4140-9EC7-6C5A368A80B8}" type="pres">
       <dgm:prSet presAssocID="{D82F8579-5693-4EDF-AEC7-74212601D461}" presName="bgRect" presStyleLbl="node1" presStyleIdx="2" presStyleCnt="4" custLinFactNeighborX="3158" custLinFactNeighborY="146"/>
       <dgm:spPr/>
+      <dgm:t>
+        <a:bodyPr/>
+        <a:lstStyle/>
+        <a:p>
+          <a:endParaRPr lang="en-US"/>
+        </a:p>
+      </dgm:t>
     </dgm:pt>
     <dgm:pt modelId="{B69E261E-B77A-4864-8E97-9383C09D8B81}" type="pres">
       <dgm:prSet presAssocID="{D82F8579-5693-4EDF-AEC7-74212601D461}" presName="parentNode" presStyleLbl="node1" presStyleIdx="2" presStyleCnt="4">
@@ -5099,6 +5135,13 @@
         </dgm:presLayoutVars>
       </dgm:prSet>
       <dgm:spPr/>
+      <dgm:t>
+        <a:bodyPr/>
+        <a:lstStyle/>
+        <a:p>
+          <a:endParaRPr lang="en-US"/>
+        </a:p>
+      </dgm:t>
     </dgm:pt>
     <dgm:pt modelId="{279A0689-15A6-44B4-A367-7082E6BE0573}" type="pres">
       <dgm:prSet presAssocID="{D82F8579-5693-4EDF-AEC7-74212601D461}" presName="childNode" presStyleLbl="node1" presStyleIdx="2" presStyleCnt="4">
@@ -5163,6 +5206,13 @@
     <dgm:pt modelId="{07A970B8-029F-4D76-8649-21B5F82F06CD}" type="pres">
       <dgm:prSet presAssocID="{CE03F113-AB50-4AFA-8490-D2A42E1ACD4B}" presName="bgRect" presStyleLbl="node1" presStyleIdx="3" presStyleCnt="4"/>
       <dgm:spPr/>
+      <dgm:t>
+        <a:bodyPr/>
+        <a:lstStyle/>
+        <a:p>
+          <a:endParaRPr lang="en-US"/>
+        </a:p>
+      </dgm:t>
     </dgm:pt>
     <dgm:pt modelId="{546857A2-B90B-442F-9F7F-B04B4D2A6CF3}" type="pres">
       <dgm:prSet presAssocID="{CE03F113-AB50-4AFA-8490-D2A42E1ACD4B}" presName="parentNode" presStyleLbl="node1" presStyleIdx="3" presStyleCnt="4">
@@ -5172,6 +5222,13 @@
         </dgm:presLayoutVars>
       </dgm:prSet>
       <dgm:spPr/>
+      <dgm:t>
+        <a:bodyPr/>
+        <a:lstStyle/>
+        <a:p>
+          <a:endParaRPr lang="en-US"/>
+        </a:p>
+      </dgm:t>
     </dgm:pt>
     <dgm:pt modelId="{58DE777D-8182-4E59-B5ED-67F5B8689015}" type="pres">
       <dgm:prSet presAssocID="{CE03F113-AB50-4AFA-8490-D2A42E1ACD4B}" presName="childNode" presStyleLbl="node1" presStyleIdx="3" presStyleCnt="4">
@@ -5180,30 +5237,37 @@
         </dgm:presLayoutVars>
       </dgm:prSet>
       <dgm:spPr/>
+      <dgm:t>
+        <a:bodyPr/>
+        <a:lstStyle/>
+        <a:p>
+          <a:endParaRPr lang="en-US"/>
+        </a:p>
+      </dgm:t>
     </dgm:pt>
   </dgm:ptLst>
   <dgm:cxnLst>
-    <dgm:cxn modelId="{FF5E337A-CAE3-4116-A92A-D93AFD5B6FB6}" type="presOf" srcId="{6BAA0EE4-E216-4DFE-8098-6F29AB1DF33F}" destId="{B01EA3BF-ADC4-4E7A-B35F-0E1BB6C7EBDE}" srcOrd="0" destOrd="0" presId="urn:microsoft.com/office/officeart/2005/8/layout/hProcess7"/>
+    <dgm:cxn modelId="{D2289952-1418-4A7A-84EE-EA9DE9A7F740}" srcId="{95C7ECCB-CDE3-44F3-B85D-ECEF206F000D}" destId="{CED13FC5-B4FC-4E9E-8936-C1B295C3ACF4}" srcOrd="0" destOrd="0" parTransId="{03A6608A-61B7-4AC3-8763-597A23137726}" sibTransId="{43B4066C-DBAC-4037-8400-E6B4622EBDE4}"/>
+    <dgm:cxn modelId="{8530E8F8-F41E-42B0-8604-317F40126522}" type="presOf" srcId="{D82F8579-5693-4EDF-AEC7-74212601D461}" destId="{9FF9C7A6-A450-4140-9EC7-6C5A368A80B8}" srcOrd="0" destOrd="0" presId="urn:microsoft.com/office/officeart/2005/8/layout/hProcess7"/>
+    <dgm:cxn modelId="{80240A69-6638-4E71-8D20-B4775848FF3F}" type="presOf" srcId="{3FB6E0CD-43CC-45AE-9F96-AEDB07B74290}" destId="{783AE301-0B7B-45D8-971F-96A0627557D0}" srcOrd="0" destOrd="0" presId="urn:microsoft.com/office/officeart/2005/8/layout/hProcess7"/>
+    <dgm:cxn modelId="{B67831B5-92EF-4471-A3ED-59144925BA3C}" srcId="{3FB6E0CD-43CC-45AE-9F96-AEDB07B74290}" destId="{B6CF3427-DE35-49D4-8AE6-E8505ACF0A22}" srcOrd="0" destOrd="0" parTransId="{A9D75665-A6CD-4D06-B112-8EADD3F1DC8E}" sibTransId="{B1723CA1-20C8-4EC0-BF3C-E90C7EF96159}"/>
+    <dgm:cxn modelId="{9633DC71-396D-4925-A551-0CD0B23EF1BA}" type="presOf" srcId="{CE03F113-AB50-4AFA-8490-D2A42E1ACD4B}" destId="{546857A2-B90B-442F-9F7F-B04B4D2A6CF3}" srcOrd="1" destOrd="0" presId="urn:microsoft.com/office/officeart/2005/8/layout/hProcess7"/>
+    <dgm:cxn modelId="{4543E9B6-5FFB-4058-9D62-7710B995642D}" srcId="{B6CF3427-DE35-49D4-8AE6-E8505ACF0A22}" destId="{6BAA0EE4-E216-4DFE-8098-6F29AB1DF33F}" srcOrd="0" destOrd="0" parTransId="{77AD5A4C-0EA8-4F6D-87E0-6C297D313883}" sibTransId="{3FD1894A-ED39-4FD5-A2A4-5881EAA4DA7F}"/>
     <dgm:cxn modelId="{C8DDE7B1-1E34-4621-8DAA-EA2A11063E75}" srcId="{3FB6E0CD-43CC-45AE-9F96-AEDB07B74290}" destId="{D82F8579-5693-4EDF-AEC7-74212601D461}" srcOrd="2" destOrd="0" parTransId="{F6575550-4DB4-458F-B5E7-A748A8A792CF}" sibTransId="{B1BA6072-0017-49B3-8159-995AD4B107A6}"/>
-    <dgm:cxn modelId="{8530E8F8-F41E-42B0-8604-317F40126522}" type="presOf" srcId="{D82F8579-5693-4EDF-AEC7-74212601D461}" destId="{9FF9C7A6-A450-4140-9EC7-6C5A368A80B8}" srcOrd="0" destOrd="0" presId="urn:microsoft.com/office/officeart/2005/8/layout/hProcess7"/>
+    <dgm:cxn modelId="{A9802BD7-37DB-442B-B3AB-B4534050DE02}" srcId="{D82F8579-5693-4EDF-AEC7-74212601D461}" destId="{7B3E3761-0953-46C4-B869-B601CED77CBF}" srcOrd="0" destOrd="0" parTransId="{5031A14F-F53F-421A-8E83-2A8C9C081307}" sibTransId="{03D8755A-6533-4D6B-B4BA-218023533B92}"/>
     <dgm:cxn modelId="{4351FB8A-2EB9-4461-8A8D-8013A4233D9E}" type="presOf" srcId="{B6CF3427-DE35-49D4-8AE6-E8505ACF0A22}" destId="{32987979-9A1A-4366-AD61-07DBB5852CB5}" srcOrd="1" destOrd="0" presId="urn:microsoft.com/office/officeart/2005/8/layout/hProcess7"/>
-    <dgm:cxn modelId="{9633DC71-396D-4925-A551-0CD0B23EF1BA}" type="presOf" srcId="{CE03F113-AB50-4AFA-8490-D2A42E1ACD4B}" destId="{546857A2-B90B-442F-9F7F-B04B4D2A6CF3}" srcOrd="1" destOrd="0" presId="urn:microsoft.com/office/officeart/2005/8/layout/hProcess7"/>
+    <dgm:cxn modelId="{F679E908-BDBD-4F40-BD7D-2287A9637630}" type="presOf" srcId="{18D8069B-DF86-4B6C-920E-55EF557B8956}" destId="{58DE777D-8182-4E59-B5ED-67F5B8689015}" srcOrd="0" destOrd="0" presId="urn:microsoft.com/office/officeart/2005/8/layout/hProcess7"/>
+    <dgm:cxn modelId="{78242A72-59B3-4393-AEEF-1E9777177199}" srcId="{3FB6E0CD-43CC-45AE-9F96-AEDB07B74290}" destId="{95C7ECCB-CDE3-44F3-B85D-ECEF206F000D}" srcOrd="1" destOrd="0" parTransId="{9BB3B48E-EE10-4543-86C4-F517795A17B3}" sibTransId="{5C9A649E-3A68-47C6-B3A2-E517D2EFEE0D}"/>
+    <dgm:cxn modelId="{3F9032AB-81BE-49DE-BD2F-722790F419AC}" type="presOf" srcId="{CE03F113-AB50-4AFA-8490-D2A42E1ACD4B}" destId="{07A970B8-029F-4D76-8649-21B5F82F06CD}" srcOrd="0" destOrd="0" presId="urn:microsoft.com/office/officeart/2005/8/layout/hProcess7"/>
+    <dgm:cxn modelId="{A00E27D0-AB05-4464-9BDC-84310D833BEB}" srcId="{CE03F113-AB50-4AFA-8490-D2A42E1ACD4B}" destId="{18D8069B-DF86-4B6C-920E-55EF557B8956}" srcOrd="0" destOrd="0" parTransId="{9075821B-BB40-4AE2-8AE0-B0DEDBB89434}" sibTransId="{2F3F9E2E-343E-4A58-BEA6-B0F231946AD9}"/>
     <dgm:cxn modelId="{74E2C781-DDC0-4A88-AAF8-5B80B9276D7F}" srcId="{3FB6E0CD-43CC-45AE-9F96-AEDB07B74290}" destId="{CE03F113-AB50-4AFA-8490-D2A42E1ACD4B}" srcOrd="3" destOrd="0" parTransId="{EB42DCF3-82A8-43CB-A467-EDD05D9968D5}" sibTransId="{032441FB-AE8F-45B8-97C9-27D0C6B23E12}"/>
-    <dgm:cxn modelId="{3F9032AB-81BE-49DE-BD2F-722790F419AC}" type="presOf" srcId="{CE03F113-AB50-4AFA-8490-D2A42E1ACD4B}" destId="{07A970B8-029F-4D76-8649-21B5F82F06CD}" srcOrd="0" destOrd="0" presId="urn:microsoft.com/office/officeart/2005/8/layout/hProcess7"/>
     <dgm:cxn modelId="{D46CC69C-F775-44F1-8EC2-17C309C3FBA7}" type="presOf" srcId="{7B3E3761-0953-46C4-B869-B601CED77CBF}" destId="{279A0689-15A6-44B4-A367-7082E6BE0573}" srcOrd="0" destOrd="0" presId="urn:microsoft.com/office/officeart/2005/8/layout/hProcess7"/>
-    <dgm:cxn modelId="{7A5197BB-021E-423A-905B-4D3E33A3F858}" type="presOf" srcId="{95C7ECCB-CDE3-44F3-B85D-ECEF206F000D}" destId="{82A4B1D1-615B-4DA5-86E2-52960FEDF681}" srcOrd="0" destOrd="0" presId="urn:microsoft.com/office/officeart/2005/8/layout/hProcess7"/>
-    <dgm:cxn modelId="{4543E9B6-5FFB-4058-9D62-7710B995642D}" srcId="{B6CF3427-DE35-49D4-8AE6-E8505ACF0A22}" destId="{6BAA0EE4-E216-4DFE-8098-6F29AB1DF33F}" srcOrd="0" destOrd="0" parTransId="{77AD5A4C-0EA8-4F6D-87E0-6C297D313883}" sibTransId="{3FD1894A-ED39-4FD5-A2A4-5881EAA4DA7F}"/>
-    <dgm:cxn modelId="{14B46E11-D154-4D14-9FF2-E0204733FAB5}" type="presOf" srcId="{B6CF3427-DE35-49D4-8AE6-E8505ACF0A22}" destId="{F154D92C-8AFE-4A13-9C4A-945DDA5332D5}" srcOrd="0" destOrd="0" presId="urn:microsoft.com/office/officeart/2005/8/layout/hProcess7"/>
-    <dgm:cxn modelId="{78242A72-59B3-4393-AEEF-1E9777177199}" srcId="{3FB6E0CD-43CC-45AE-9F96-AEDB07B74290}" destId="{95C7ECCB-CDE3-44F3-B85D-ECEF206F000D}" srcOrd="1" destOrd="0" parTransId="{9BB3B48E-EE10-4543-86C4-F517795A17B3}" sibTransId="{5C9A649E-3A68-47C6-B3A2-E517D2EFEE0D}"/>
-    <dgm:cxn modelId="{A00E27D0-AB05-4464-9BDC-84310D833BEB}" srcId="{CE03F113-AB50-4AFA-8490-D2A42E1ACD4B}" destId="{18D8069B-DF86-4B6C-920E-55EF557B8956}" srcOrd="0" destOrd="0" parTransId="{9075821B-BB40-4AE2-8AE0-B0DEDBB89434}" sibTransId="{2F3F9E2E-343E-4A58-BEA6-B0F231946AD9}"/>
-    <dgm:cxn modelId="{D2289952-1418-4A7A-84EE-EA9DE9A7F740}" srcId="{95C7ECCB-CDE3-44F3-B85D-ECEF206F000D}" destId="{CED13FC5-B4FC-4E9E-8936-C1B295C3ACF4}" srcOrd="0" destOrd="0" parTransId="{03A6608A-61B7-4AC3-8763-597A23137726}" sibTransId="{43B4066C-DBAC-4037-8400-E6B4622EBDE4}"/>
     <dgm:cxn modelId="{8AF50CA4-0C6B-45D5-9A9F-2DEE336CCEFA}" type="presOf" srcId="{95C7ECCB-CDE3-44F3-B85D-ECEF206F000D}" destId="{211EA36C-963B-420E-A84D-E62101262AC8}" srcOrd="1" destOrd="0" presId="urn:microsoft.com/office/officeart/2005/8/layout/hProcess7"/>
     <dgm:cxn modelId="{1BB2D52D-5288-4F81-8987-F4E20CE32528}" type="presOf" srcId="{D82F8579-5693-4EDF-AEC7-74212601D461}" destId="{B69E261E-B77A-4864-8E97-9383C09D8B81}" srcOrd="1" destOrd="0" presId="urn:microsoft.com/office/officeart/2005/8/layout/hProcess7"/>
+    <dgm:cxn modelId="{14B46E11-D154-4D14-9FF2-E0204733FAB5}" type="presOf" srcId="{B6CF3427-DE35-49D4-8AE6-E8505ACF0A22}" destId="{F154D92C-8AFE-4A13-9C4A-945DDA5332D5}" srcOrd="0" destOrd="0" presId="urn:microsoft.com/office/officeart/2005/8/layout/hProcess7"/>
+    <dgm:cxn modelId="{7A5197BB-021E-423A-905B-4D3E33A3F858}" type="presOf" srcId="{95C7ECCB-CDE3-44F3-B85D-ECEF206F000D}" destId="{82A4B1D1-615B-4DA5-86E2-52960FEDF681}" srcOrd="0" destOrd="0" presId="urn:microsoft.com/office/officeart/2005/8/layout/hProcess7"/>
+    <dgm:cxn modelId="{FF5E337A-CAE3-4116-A92A-D93AFD5B6FB6}" type="presOf" srcId="{6BAA0EE4-E216-4DFE-8098-6F29AB1DF33F}" destId="{B01EA3BF-ADC4-4E7A-B35F-0E1BB6C7EBDE}" srcOrd="0" destOrd="0" presId="urn:microsoft.com/office/officeart/2005/8/layout/hProcess7"/>
     <dgm:cxn modelId="{D144A201-0349-4473-829F-B2712E2C6EEC}" type="presOf" srcId="{CED13FC5-B4FC-4E9E-8936-C1B295C3ACF4}" destId="{0EB3E76F-394C-4E6D-B62E-5EAA3F6D5152}" srcOrd="0" destOrd="0" presId="urn:microsoft.com/office/officeart/2005/8/layout/hProcess7"/>
-    <dgm:cxn modelId="{F679E908-BDBD-4F40-BD7D-2287A9637630}" type="presOf" srcId="{18D8069B-DF86-4B6C-920E-55EF557B8956}" destId="{58DE777D-8182-4E59-B5ED-67F5B8689015}" srcOrd="0" destOrd="0" presId="urn:microsoft.com/office/officeart/2005/8/layout/hProcess7"/>
-    <dgm:cxn modelId="{B67831B5-92EF-4471-A3ED-59144925BA3C}" srcId="{3FB6E0CD-43CC-45AE-9F96-AEDB07B74290}" destId="{B6CF3427-DE35-49D4-8AE6-E8505ACF0A22}" srcOrd="0" destOrd="0" parTransId="{A9D75665-A6CD-4D06-B112-8EADD3F1DC8E}" sibTransId="{B1723CA1-20C8-4EC0-BF3C-E90C7EF96159}"/>
-    <dgm:cxn modelId="{80240A69-6638-4E71-8D20-B4775848FF3F}" type="presOf" srcId="{3FB6E0CD-43CC-45AE-9F96-AEDB07B74290}" destId="{783AE301-0B7B-45D8-971F-96A0627557D0}" srcOrd="0" destOrd="0" presId="urn:microsoft.com/office/officeart/2005/8/layout/hProcess7"/>
-    <dgm:cxn modelId="{A9802BD7-37DB-442B-B3AB-B4534050DE02}" srcId="{D82F8579-5693-4EDF-AEC7-74212601D461}" destId="{7B3E3761-0953-46C4-B869-B601CED77CBF}" srcOrd="0" destOrd="0" parTransId="{5031A14F-F53F-421A-8E83-2A8C9C081307}" sibTransId="{03D8755A-6533-4D6B-B4BA-218023533B92}"/>
     <dgm:cxn modelId="{5C1E0FE2-FC91-4AFE-BEF5-88B66A63507D}" type="presParOf" srcId="{783AE301-0B7B-45D8-971F-96A0627557D0}" destId="{0B34A907-D616-41BD-ABB5-FFD2A4AD9FC0}" srcOrd="0" destOrd="0" presId="urn:microsoft.com/office/officeart/2005/8/layout/hProcess7"/>
     <dgm:cxn modelId="{28166814-2DDD-4CE1-B2BC-8613C1555288}" type="presParOf" srcId="{0B34A907-D616-41BD-ABB5-FFD2A4AD9FC0}" destId="{F154D92C-8AFE-4A13-9C4A-945DDA5332D5}" srcOrd="0" destOrd="0" presId="urn:microsoft.com/office/officeart/2005/8/layout/hProcess7"/>
     <dgm:cxn modelId="{4AC57604-A4C4-4909-98B5-9DB8DA53104C}" type="presParOf" srcId="{0B34A907-D616-41BD-ABB5-FFD2A4AD9FC0}" destId="{32987979-9A1A-4366-AD61-07DBB5852CB5}" srcOrd="1" destOrd="0" presId="urn:microsoft.com/office/officeart/2005/8/layout/hProcess7"/>
@@ -5469,7 +5533,17 @@
         <a:p>
           <a:r>
             <a:rPr lang="en-US" dirty="0" smtClean="0"/>
-            <a:t>Gaussian Linear A &amp; K, Close BC </a:t>
+            <a:t>Gaussian Linear A &amp; K, </a:t>
+          </a:r>
+          <a:r>
+            <a:rPr lang="en-US" dirty="0" smtClean="0"/>
+            <a:t>Active</a:t>
+          </a:r>
+        </a:p>
+        <a:p>
+          <a:r>
+            <a:rPr lang="en-US" dirty="0" smtClean="0"/>
+            <a:t>BC </a:t>
           </a:r>
           <a:endParaRPr lang="en-US" dirty="0"/>
         </a:p>
@@ -5506,7 +5580,15 @@
         <a:p>
           <a:r>
             <a:rPr lang="en-US" dirty="0" smtClean="0"/>
-            <a:t>Linear Flow Field Close BC</a:t>
+            <a:t>Linear Flow Field </a:t>
+          </a:r>
+          <a:r>
+            <a:rPr lang="en-US" dirty="0" smtClean="0"/>
+            <a:t>Active </a:t>
+          </a:r>
+          <a:r>
+            <a:rPr lang="en-US" dirty="0" smtClean="0"/>
+            <a:t>BC</a:t>
           </a:r>
           <a:endParaRPr lang="en-US" dirty="0"/>
         </a:p>
@@ -5543,6 +5625,13 @@
         </dgm:presLayoutVars>
       </dgm:prSet>
       <dgm:spPr/>
+      <dgm:t>
+        <a:bodyPr/>
+        <a:lstStyle/>
+        <a:p>
+          <a:endParaRPr lang="en-US"/>
+        </a:p>
+      </dgm:t>
     </dgm:pt>
     <dgm:pt modelId="{0B34A907-D616-41BD-ABB5-FFD2A4AD9FC0}" type="pres">
       <dgm:prSet presAssocID="{B6CF3427-DE35-49D4-8AE6-E8505ACF0A22}" presName="compositeNode" presStyleCnt="0">
@@ -5555,6 +5644,13 @@
     <dgm:pt modelId="{F154D92C-8AFE-4A13-9C4A-945DDA5332D5}" type="pres">
       <dgm:prSet presAssocID="{B6CF3427-DE35-49D4-8AE6-E8505ACF0A22}" presName="bgRect" presStyleLbl="node1" presStyleIdx="0" presStyleCnt="3"/>
       <dgm:spPr/>
+      <dgm:t>
+        <a:bodyPr/>
+        <a:lstStyle/>
+        <a:p>
+          <a:endParaRPr lang="en-US"/>
+        </a:p>
+      </dgm:t>
     </dgm:pt>
     <dgm:pt modelId="{32987979-9A1A-4366-AD61-07DBB5852CB5}" type="pres">
       <dgm:prSet presAssocID="{B6CF3427-DE35-49D4-8AE6-E8505ACF0A22}" presName="parentNode" presStyleLbl="node1" presStyleIdx="0" presStyleCnt="3">
@@ -5564,6 +5660,13 @@
         </dgm:presLayoutVars>
       </dgm:prSet>
       <dgm:spPr/>
+      <dgm:t>
+        <a:bodyPr/>
+        <a:lstStyle/>
+        <a:p>
+          <a:endParaRPr lang="en-US"/>
+        </a:p>
+      </dgm:t>
     </dgm:pt>
     <dgm:pt modelId="{B01EA3BF-ADC4-4E7A-B35F-0E1BB6C7EBDE}" type="pres">
       <dgm:prSet presAssocID="{B6CF3427-DE35-49D4-8AE6-E8505ACF0A22}" presName="childNode" presStyleLbl="node1" presStyleIdx="0" presStyleCnt="3">
@@ -5701,6 +5804,13 @@
     <dgm:pt modelId="{9FF9C7A6-A450-4140-9EC7-6C5A368A80B8}" type="pres">
       <dgm:prSet presAssocID="{D82F8579-5693-4EDF-AEC7-74212601D461}" presName="bgRect" presStyleLbl="node1" presStyleIdx="2" presStyleCnt="3" custLinFactNeighborX="3158" custLinFactNeighborY="146"/>
       <dgm:spPr/>
+      <dgm:t>
+        <a:bodyPr/>
+        <a:lstStyle/>
+        <a:p>
+          <a:endParaRPr lang="en-US"/>
+        </a:p>
+      </dgm:t>
     </dgm:pt>
     <dgm:pt modelId="{B69E261E-B77A-4864-8E97-9383C09D8B81}" type="pres">
       <dgm:prSet presAssocID="{D82F8579-5693-4EDF-AEC7-74212601D461}" presName="parentNode" presStyleLbl="node1" presStyleIdx="2" presStyleCnt="3">
@@ -5710,6 +5820,13 @@
         </dgm:presLayoutVars>
       </dgm:prSet>
       <dgm:spPr/>
+      <dgm:t>
+        <a:bodyPr/>
+        <a:lstStyle/>
+        <a:p>
+          <a:endParaRPr lang="en-US"/>
+        </a:p>
+      </dgm:t>
     </dgm:pt>
     <dgm:pt modelId="{279A0689-15A6-44B4-A367-7082E6BE0573}" type="pres">
       <dgm:prSet presAssocID="{D82F8579-5693-4EDF-AEC7-74212601D461}" presName="childNode" presStyleLbl="node1" presStyleIdx="2" presStyleCnt="3">
@@ -5728,24 +5845,24 @@
     </dgm:pt>
   </dgm:ptLst>
   <dgm:cxnLst>
+    <dgm:cxn modelId="{800CFA4D-3EB9-4FD6-9329-F5C4E21F93A3}" type="presOf" srcId="{D82F8579-5693-4EDF-AEC7-74212601D461}" destId="{B69E261E-B77A-4864-8E97-9383C09D8B81}" srcOrd="1" destOrd="0" presId="urn:microsoft.com/office/officeart/2005/8/layout/hProcess7"/>
+    <dgm:cxn modelId="{B67831B5-92EF-4471-A3ED-59144925BA3C}" srcId="{3FB6E0CD-43CC-45AE-9F96-AEDB07B74290}" destId="{B6CF3427-DE35-49D4-8AE6-E8505ACF0A22}" srcOrd="0" destOrd="0" parTransId="{A9D75665-A6CD-4D06-B112-8EADD3F1DC8E}" sibTransId="{B1723CA1-20C8-4EC0-BF3C-E90C7EF96159}"/>
+    <dgm:cxn modelId="{2477CF61-C0A3-41B3-94CB-75509AADDABA}" type="presOf" srcId="{5627D8AD-42B1-49AC-AFF0-F8EB1B9D5E19}" destId="{279A0689-15A6-44B4-A367-7082E6BE0573}" srcOrd="0" destOrd="1" presId="urn:microsoft.com/office/officeart/2005/8/layout/hProcess7"/>
+    <dgm:cxn modelId="{F74C9A75-8E63-4421-A248-B4DAB788261A}" type="presOf" srcId="{7B3E3761-0953-46C4-B869-B601CED77CBF}" destId="{279A0689-15A6-44B4-A367-7082E6BE0573}" srcOrd="0" destOrd="0" presId="urn:microsoft.com/office/officeart/2005/8/layout/hProcess7"/>
+    <dgm:cxn modelId="{A5548FFA-CF7F-4FB4-BA92-D49B1064F4B4}" type="presOf" srcId="{D82F8579-5693-4EDF-AEC7-74212601D461}" destId="{9FF9C7A6-A450-4140-9EC7-6C5A368A80B8}" srcOrd="0" destOrd="0" presId="urn:microsoft.com/office/officeart/2005/8/layout/hProcess7"/>
+    <dgm:cxn modelId="{0FE914DC-A811-4E3D-9AB9-65CAAB1AB054}" type="presOf" srcId="{95C7ECCB-CDE3-44F3-B85D-ECEF206F000D}" destId="{211EA36C-963B-420E-A84D-E62101262AC8}" srcOrd="1" destOrd="0" presId="urn:microsoft.com/office/officeart/2005/8/layout/hProcess7"/>
+    <dgm:cxn modelId="{47C7E4ED-05B1-4F27-BFD8-06B61C9D29AC}" type="presOf" srcId="{95C7ECCB-CDE3-44F3-B85D-ECEF206F000D}" destId="{82A4B1D1-615B-4DA5-86E2-52960FEDF681}" srcOrd="0" destOrd="0" presId="urn:microsoft.com/office/officeart/2005/8/layout/hProcess7"/>
+    <dgm:cxn modelId="{D6564896-A449-44C5-8622-3AEE460DA7FE}" type="presOf" srcId="{3FB6E0CD-43CC-45AE-9F96-AEDB07B74290}" destId="{783AE301-0B7B-45D8-971F-96A0627557D0}" srcOrd="0" destOrd="0" presId="urn:microsoft.com/office/officeart/2005/8/layout/hProcess7"/>
+    <dgm:cxn modelId="{4543E9B6-5FFB-4058-9D62-7710B995642D}" srcId="{B6CF3427-DE35-49D4-8AE6-E8505ACF0A22}" destId="{6BAA0EE4-E216-4DFE-8098-6F29AB1DF33F}" srcOrd="0" destOrd="0" parTransId="{77AD5A4C-0EA8-4F6D-87E0-6C297D313883}" sibTransId="{3FD1894A-ED39-4FD5-A2A4-5881EAA4DA7F}"/>
     <dgm:cxn modelId="{1DA85292-7AAC-447A-BF2C-A1D246795D2B}" type="presOf" srcId="{B6CF3427-DE35-49D4-8AE6-E8505ACF0A22}" destId="{F154D92C-8AFE-4A13-9C4A-945DDA5332D5}" srcOrd="0" destOrd="0" presId="urn:microsoft.com/office/officeart/2005/8/layout/hProcess7"/>
-    <dgm:cxn modelId="{0FE914DC-A811-4E3D-9AB9-65CAAB1AB054}" type="presOf" srcId="{95C7ECCB-CDE3-44F3-B85D-ECEF206F000D}" destId="{211EA36C-963B-420E-A84D-E62101262AC8}" srcOrd="1" destOrd="0" presId="urn:microsoft.com/office/officeart/2005/8/layout/hProcess7"/>
+    <dgm:cxn modelId="{78242A72-59B3-4393-AEEF-1E9777177199}" srcId="{3FB6E0CD-43CC-45AE-9F96-AEDB07B74290}" destId="{95C7ECCB-CDE3-44F3-B85D-ECEF206F000D}" srcOrd="1" destOrd="0" parTransId="{9BB3B48E-EE10-4543-86C4-F517795A17B3}" sibTransId="{5C9A649E-3A68-47C6-B3A2-E517D2EFEE0D}"/>
+    <dgm:cxn modelId="{C8DDE7B1-1E34-4621-8DAA-EA2A11063E75}" srcId="{3FB6E0CD-43CC-45AE-9F96-AEDB07B74290}" destId="{D82F8579-5693-4EDF-AEC7-74212601D461}" srcOrd="2" destOrd="0" parTransId="{F6575550-4DB4-458F-B5E7-A748A8A792CF}" sibTransId="{B1BA6072-0017-49B3-8159-995AD4B107A6}"/>
+    <dgm:cxn modelId="{2D4BD4BC-85CC-4CCA-8420-2DD666C5EAEB}" type="presOf" srcId="{CED13FC5-B4FC-4E9E-8936-C1B295C3ACF4}" destId="{0EB3E76F-394C-4E6D-B62E-5EAA3F6D5152}" srcOrd="0" destOrd="0" presId="urn:microsoft.com/office/officeart/2005/8/layout/hProcess7"/>
+    <dgm:cxn modelId="{808F55DA-32BF-40F4-8277-A62742FC87E6}" type="presOf" srcId="{B6CF3427-DE35-49D4-8AE6-E8505ACF0A22}" destId="{32987979-9A1A-4366-AD61-07DBB5852CB5}" srcOrd="1" destOrd="0" presId="urn:microsoft.com/office/officeart/2005/8/layout/hProcess7"/>
+    <dgm:cxn modelId="{5E10AA42-ABCF-4C44-BCBF-3B3208768C55}" srcId="{D82F8579-5693-4EDF-AEC7-74212601D461}" destId="{5627D8AD-42B1-49AC-AFF0-F8EB1B9D5E19}" srcOrd="1" destOrd="0" parTransId="{BA4193CB-B9E1-4119-B3AC-F145D689D7B5}" sibTransId="{047792F4-BF06-44D3-AB85-AA00592369F2}"/>
+    <dgm:cxn modelId="{D2289952-1418-4A7A-84EE-EA9DE9A7F740}" srcId="{95C7ECCB-CDE3-44F3-B85D-ECEF206F000D}" destId="{CED13FC5-B4FC-4E9E-8936-C1B295C3ACF4}" srcOrd="0" destOrd="0" parTransId="{03A6608A-61B7-4AC3-8763-597A23137726}" sibTransId="{43B4066C-DBAC-4037-8400-E6B4622EBDE4}"/>
     <dgm:cxn modelId="{A9802BD7-37DB-442B-B3AB-B4534050DE02}" srcId="{D82F8579-5693-4EDF-AEC7-74212601D461}" destId="{7B3E3761-0953-46C4-B869-B601CED77CBF}" srcOrd="0" destOrd="0" parTransId="{5031A14F-F53F-421A-8E83-2A8C9C081307}" sibTransId="{03D8755A-6533-4D6B-B4BA-218023533B92}"/>
-    <dgm:cxn modelId="{A5548FFA-CF7F-4FB4-BA92-D49B1064F4B4}" type="presOf" srcId="{D82F8579-5693-4EDF-AEC7-74212601D461}" destId="{9FF9C7A6-A450-4140-9EC7-6C5A368A80B8}" srcOrd="0" destOrd="0" presId="urn:microsoft.com/office/officeart/2005/8/layout/hProcess7"/>
-    <dgm:cxn modelId="{5E10AA42-ABCF-4C44-BCBF-3B3208768C55}" srcId="{D82F8579-5693-4EDF-AEC7-74212601D461}" destId="{5627D8AD-42B1-49AC-AFF0-F8EB1B9D5E19}" srcOrd="1" destOrd="0" parTransId="{BA4193CB-B9E1-4119-B3AC-F145D689D7B5}" sibTransId="{047792F4-BF06-44D3-AB85-AA00592369F2}"/>
-    <dgm:cxn modelId="{2D4BD4BC-85CC-4CCA-8420-2DD666C5EAEB}" type="presOf" srcId="{CED13FC5-B4FC-4E9E-8936-C1B295C3ACF4}" destId="{0EB3E76F-394C-4E6D-B62E-5EAA3F6D5152}" srcOrd="0" destOrd="0" presId="urn:microsoft.com/office/officeart/2005/8/layout/hProcess7"/>
-    <dgm:cxn modelId="{B67831B5-92EF-4471-A3ED-59144925BA3C}" srcId="{3FB6E0CD-43CC-45AE-9F96-AEDB07B74290}" destId="{B6CF3427-DE35-49D4-8AE6-E8505ACF0A22}" srcOrd="0" destOrd="0" parTransId="{A9D75665-A6CD-4D06-B112-8EADD3F1DC8E}" sibTransId="{B1723CA1-20C8-4EC0-BF3C-E90C7EF96159}"/>
-    <dgm:cxn modelId="{D2289952-1418-4A7A-84EE-EA9DE9A7F740}" srcId="{95C7ECCB-CDE3-44F3-B85D-ECEF206F000D}" destId="{CED13FC5-B4FC-4E9E-8936-C1B295C3ACF4}" srcOrd="0" destOrd="0" parTransId="{03A6608A-61B7-4AC3-8763-597A23137726}" sibTransId="{43B4066C-DBAC-4037-8400-E6B4622EBDE4}"/>
-    <dgm:cxn modelId="{800CFA4D-3EB9-4FD6-9329-F5C4E21F93A3}" type="presOf" srcId="{D82F8579-5693-4EDF-AEC7-74212601D461}" destId="{B69E261E-B77A-4864-8E97-9383C09D8B81}" srcOrd="1" destOrd="0" presId="urn:microsoft.com/office/officeart/2005/8/layout/hProcess7"/>
-    <dgm:cxn modelId="{808F55DA-32BF-40F4-8277-A62742FC87E6}" type="presOf" srcId="{B6CF3427-DE35-49D4-8AE6-E8505ACF0A22}" destId="{32987979-9A1A-4366-AD61-07DBB5852CB5}" srcOrd="1" destOrd="0" presId="urn:microsoft.com/office/officeart/2005/8/layout/hProcess7"/>
-    <dgm:cxn modelId="{47C7E4ED-05B1-4F27-BFD8-06B61C9D29AC}" type="presOf" srcId="{95C7ECCB-CDE3-44F3-B85D-ECEF206F000D}" destId="{82A4B1D1-615B-4DA5-86E2-52960FEDF681}" srcOrd="0" destOrd="0" presId="urn:microsoft.com/office/officeart/2005/8/layout/hProcess7"/>
-    <dgm:cxn modelId="{2477CF61-C0A3-41B3-94CB-75509AADDABA}" type="presOf" srcId="{5627D8AD-42B1-49AC-AFF0-F8EB1B9D5E19}" destId="{279A0689-15A6-44B4-A367-7082E6BE0573}" srcOrd="0" destOrd="1" presId="urn:microsoft.com/office/officeart/2005/8/layout/hProcess7"/>
-    <dgm:cxn modelId="{C8DDE7B1-1E34-4621-8DAA-EA2A11063E75}" srcId="{3FB6E0CD-43CC-45AE-9F96-AEDB07B74290}" destId="{D82F8579-5693-4EDF-AEC7-74212601D461}" srcOrd="2" destOrd="0" parTransId="{F6575550-4DB4-458F-B5E7-A748A8A792CF}" sibTransId="{B1BA6072-0017-49B3-8159-995AD4B107A6}"/>
-    <dgm:cxn modelId="{78242A72-59B3-4393-AEEF-1E9777177199}" srcId="{3FB6E0CD-43CC-45AE-9F96-AEDB07B74290}" destId="{95C7ECCB-CDE3-44F3-B85D-ECEF206F000D}" srcOrd="1" destOrd="0" parTransId="{9BB3B48E-EE10-4543-86C4-F517795A17B3}" sibTransId="{5C9A649E-3A68-47C6-B3A2-E517D2EFEE0D}"/>
     <dgm:cxn modelId="{EF073B33-BE90-4706-9EAB-2A88BA1A0E37}" type="presOf" srcId="{6BAA0EE4-E216-4DFE-8098-6F29AB1DF33F}" destId="{B01EA3BF-ADC4-4E7A-B35F-0E1BB6C7EBDE}" srcOrd="0" destOrd="0" presId="urn:microsoft.com/office/officeart/2005/8/layout/hProcess7"/>
-    <dgm:cxn modelId="{F74C9A75-8E63-4421-A248-B4DAB788261A}" type="presOf" srcId="{7B3E3761-0953-46C4-B869-B601CED77CBF}" destId="{279A0689-15A6-44B4-A367-7082E6BE0573}" srcOrd="0" destOrd="0" presId="urn:microsoft.com/office/officeart/2005/8/layout/hProcess7"/>
-    <dgm:cxn modelId="{4543E9B6-5FFB-4058-9D62-7710B995642D}" srcId="{B6CF3427-DE35-49D4-8AE6-E8505ACF0A22}" destId="{6BAA0EE4-E216-4DFE-8098-6F29AB1DF33F}" srcOrd="0" destOrd="0" parTransId="{77AD5A4C-0EA8-4F6D-87E0-6C297D313883}" sibTransId="{3FD1894A-ED39-4FD5-A2A4-5881EAA4DA7F}"/>
-    <dgm:cxn modelId="{D6564896-A449-44C5-8622-3AEE460DA7FE}" type="presOf" srcId="{3FB6E0CD-43CC-45AE-9F96-AEDB07B74290}" destId="{783AE301-0B7B-45D8-971F-96A0627557D0}" srcOrd="0" destOrd="0" presId="urn:microsoft.com/office/officeart/2005/8/layout/hProcess7"/>
     <dgm:cxn modelId="{256ADB97-8503-4101-A02E-F779B91B299F}" type="presParOf" srcId="{783AE301-0B7B-45D8-971F-96A0627557D0}" destId="{0B34A907-D616-41BD-ABB5-FFD2A4AD9FC0}" srcOrd="0" destOrd="0" presId="urn:microsoft.com/office/officeart/2005/8/layout/hProcess7"/>
     <dgm:cxn modelId="{FA170C46-6C31-447F-BF1F-500877CE2968}" type="presParOf" srcId="{0B34A907-D616-41BD-ABB5-FFD2A4AD9FC0}" destId="{F154D92C-8AFE-4A13-9C4A-945DDA5332D5}" srcOrd="0" destOrd="0" presId="urn:microsoft.com/office/officeart/2005/8/layout/hProcess7"/>
     <dgm:cxn modelId="{80274386-D92D-4A61-BCB3-D0D08BA1D544}" type="presParOf" srcId="{0B34A907-D616-41BD-ABB5-FFD2A4AD9FC0}" destId="{32987979-9A1A-4366-AD61-07DBB5852CB5}" srcOrd="1" destOrd="0" presId="urn:microsoft.com/office/officeart/2005/8/layout/hProcess7"/>
@@ -5960,6 +6077,13 @@
         </dgm:presLayoutVars>
       </dgm:prSet>
       <dgm:spPr/>
+      <dgm:t>
+        <a:bodyPr/>
+        <a:lstStyle/>
+        <a:p>
+          <a:endParaRPr lang="en-US"/>
+        </a:p>
+      </dgm:t>
     </dgm:pt>
     <dgm:pt modelId="{0B34A907-D616-41BD-ABB5-FFD2A4AD9FC0}" type="pres">
       <dgm:prSet presAssocID="{B6CF3427-DE35-49D4-8AE6-E8505ACF0A22}" presName="compositeNode" presStyleCnt="0">
@@ -6094,17 +6218,17 @@
     </dgm:pt>
   </dgm:ptLst>
   <dgm:cxnLst>
+    <dgm:cxn modelId="{29DF62EB-FA4A-40AF-9F35-5BF19671C731}" type="presOf" srcId="{3FB6E0CD-43CC-45AE-9F96-AEDB07B74290}" destId="{783AE301-0B7B-45D8-971F-96A0627557D0}" srcOrd="0" destOrd="0" presId="urn:microsoft.com/office/officeart/2005/8/layout/hProcess7"/>
+    <dgm:cxn modelId="{7C01AD42-B0D3-419F-AC89-095F699FF4AE}" type="presOf" srcId="{B6CF3427-DE35-49D4-8AE6-E8505ACF0A22}" destId="{32987979-9A1A-4366-AD61-07DBB5852CB5}" srcOrd="1" destOrd="0" presId="urn:microsoft.com/office/officeart/2005/8/layout/hProcess7"/>
+    <dgm:cxn modelId="{78242A72-59B3-4393-AEEF-1E9777177199}" srcId="{3FB6E0CD-43CC-45AE-9F96-AEDB07B74290}" destId="{95C7ECCB-CDE3-44F3-B85D-ECEF206F000D}" srcOrd="1" destOrd="0" parTransId="{9BB3B48E-EE10-4543-86C4-F517795A17B3}" sibTransId="{5C9A649E-3A68-47C6-B3A2-E517D2EFEE0D}"/>
     <dgm:cxn modelId="{4543E9B6-5FFB-4058-9D62-7710B995642D}" srcId="{B6CF3427-DE35-49D4-8AE6-E8505ACF0A22}" destId="{6BAA0EE4-E216-4DFE-8098-6F29AB1DF33F}" srcOrd="0" destOrd="0" parTransId="{77AD5A4C-0EA8-4F6D-87E0-6C297D313883}" sibTransId="{3FD1894A-ED39-4FD5-A2A4-5881EAA4DA7F}"/>
+    <dgm:cxn modelId="{D2289952-1418-4A7A-84EE-EA9DE9A7F740}" srcId="{95C7ECCB-CDE3-44F3-B85D-ECEF206F000D}" destId="{CED13FC5-B4FC-4E9E-8936-C1B295C3ACF4}" srcOrd="0" destOrd="0" parTransId="{03A6608A-61B7-4AC3-8763-597A23137726}" sibTransId="{43B4066C-DBAC-4037-8400-E6B4622EBDE4}"/>
+    <dgm:cxn modelId="{C3316876-2A02-4EB8-81EA-F074273081EF}" type="presOf" srcId="{95C7ECCB-CDE3-44F3-B85D-ECEF206F000D}" destId="{82A4B1D1-615B-4DA5-86E2-52960FEDF681}" srcOrd="0" destOrd="0" presId="urn:microsoft.com/office/officeart/2005/8/layout/hProcess7"/>
+    <dgm:cxn modelId="{9359298C-6086-49A9-A3C5-EC8FE402528A}" type="presOf" srcId="{B6CF3427-DE35-49D4-8AE6-E8505ACF0A22}" destId="{F154D92C-8AFE-4A13-9C4A-945DDA5332D5}" srcOrd="0" destOrd="0" presId="urn:microsoft.com/office/officeart/2005/8/layout/hProcess7"/>
+    <dgm:cxn modelId="{B67831B5-92EF-4471-A3ED-59144925BA3C}" srcId="{3FB6E0CD-43CC-45AE-9F96-AEDB07B74290}" destId="{B6CF3427-DE35-49D4-8AE6-E8505ACF0A22}" srcOrd="0" destOrd="0" parTransId="{A9D75665-A6CD-4D06-B112-8EADD3F1DC8E}" sibTransId="{B1723CA1-20C8-4EC0-BF3C-E90C7EF96159}"/>
     <dgm:cxn modelId="{B06B9B4B-4D27-4B2D-B8F8-95A27B1FEA69}" type="presOf" srcId="{6BAA0EE4-E216-4DFE-8098-6F29AB1DF33F}" destId="{B01EA3BF-ADC4-4E7A-B35F-0E1BB6C7EBDE}" srcOrd="0" destOrd="0" presId="urn:microsoft.com/office/officeart/2005/8/layout/hProcess7"/>
-    <dgm:cxn modelId="{78242A72-59B3-4393-AEEF-1E9777177199}" srcId="{3FB6E0CD-43CC-45AE-9F96-AEDB07B74290}" destId="{95C7ECCB-CDE3-44F3-B85D-ECEF206F000D}" srcOrd="1" destOrd="0" parTransId="{9BB3B48E-EE10-4543-86C4-F517795A17B3}" sibTransId="{5C9A649E-3A68-47C6-B3A2-E517D2EFEE0D}"/>
     <dgm:cxn modelId="{99E418FD-CFF4-4E87-9EA3-7270A3BBCB75}" type="presOf" srcId="{CED13FC5-B4FC-4E9E-8936-C1B295C3ACF4}" destId="{0EB3E76F-394C-4E6D-B62E-5EAA3F6D5152}" srcOrd="0" destOrd="0" presId="urn:microsoft.com/office/officeart/2005/8/layout/hProcess7"/>
     <dgm:cxn modelId="{9A93BE2B-C20E-417A-86AA-0060BF62999D}" type="presOf" srcId="{95C7ECCB-CDE3-44F3-B85D-ECEF206F000D}" destId="{211EA36C-963B-420E-A84D-E62101262AC8}" srcOrd="1" destOrd="0" presId="urn:microsoft.com/office/officeart/2005/8/layout/hProcess7"/>
-    <dgm:cxn modelId="{29DF62EB-FA4A-40AF-9F35-5BF19671C731}" type="presOf" srcId="{3FB6E0CD-43CC-45AE-9F96-AEDB07B74290}" destId="{783AE301-0B7B-45D8-971F-96A0627557D0}" srcOrd="0" destOrd="0" presId="urn:microsoft.com/office/officeart/2005/8/layout/hProcess7"/>
-    <dgm:cxn modelId="{B67831B5-92EF-4471-A3ED-59144925BA3C}" srcId="{3FB6E0CD-43CC-45AE-9F96-AEDB07B74290}" destId="{B6CF3427-DE35-49D4-8AE6-E8505ACF0A22}" srcOrd="0" destOrd="0" parTransId="{A9D75665-A6CD-4D06-B112-8EADD3F1DC8E}" sibTransId="{B1723CA1-20C8-4EC0-BF3C-E90C7EF96159}"/>
-    <dgm:cxn modelId="{D2289952-1418-4A7A-84EE-EA9DE9A7F740}" srcId="{95C7ECCB-CDE3-44F3-B85D-ECEF206F000D}" destId="{CED13FC5-B4FC-4E9E-8936-C1B295C3ACF4}" srcOrd="0" destOrd="0" parTransId="{03A6608A-61B7-4AC3-8763-597A23137726}" sibTransId="{43B4066C-DBAC-4037-8400-E6B4622EBDE4}"/>
-    <dgm:cxn modelId="{7C01AD42-B0D3-419F-AC89-095F699FF4AE}" type="presOf" srcId="{B6CF3427-DE35-49D4-8AE6-E8505ACF0A22}" destId="{32987979-9A1A-4366-AD61-07DBB5852CB5}" srcOrd="1" destOrd="0" presId="urn:microsoft.com/office/officeart/2005/8/layout/hProcess7"/>
-    <dgm:cxn modelId="{9359298C-6086-49A9-A3C5-EC8FE402528A}" type="presOf" srcId="{B6CF3427-DE35-49D4-8AE6-E8505ACF0A22}" destId="{F154D92C-8AFE-4A13-9C4A-945DDA5332D5}" srcOrd="0" destOrd="0" presId="urn:microsoft.com/office/officeart/2005/8/layout/hProcess7"/>
-    <dgm:cxn modelId="{C3316876-2A02-4EB8-81EA-F074273081EF}" type="presOf" srcId="{95C7ECCB-CDE3-44F3-B85D-ECEF206F000D}" destId="{82A4B1D1-615B-4DA5-86E2-52960FEDF681}" srcOrd="0" destOrd="0" presId="urn:microsoft.com/office/officeart/2005/8/layout/hProcess7"/>
     <dgm:cxn modelId="{52212B24-9F44-4B55-A0AA-479430B7F1B2}" type="presParOf" srcId="{783AE301-0B7B-45D8-971F-96A0627557D0}" destId="{0B34A907-D616-41BD-ABB5-FFD2A4AD9FC0}" srcOrd="0" destOrd="0" presId="urn:microsoft.com/office/officeart/2005/8/layout/hProcess7"/>
     <dgm:cxn modelId="{80885168-B6B0-4739-8CCB-C450BE74E889}" type="presParOf" srcId="{0B34A907-D616-41BD-ABB5-FFD2A4AD9FC0}" destId="{F154D92C-8AFE-4A13-9C4A-945DDA5332D5}" srcOrd="0" destOrd="0" presId="urn:microsoft.com/office/officeart/2005/8/layout/hProcess7"/>
     <dgm:cxn modelId="{87389A24-2D83-4F47-850B-733CFBA6EA6E}" type="presParOf" srcId="{0B34A907-D616-41BD-ABB5-FFD2A4AD9FC0}" destId="{32987979-9A1A-4366-AD61-07DBB5852CB5}" srcOrd="1" destOrd="0" presId="urn:microsoft.com/office/officeart/2005/8/layout/hProcess7"/>
@@ -6194,7 +6318,15 @@
         <a:p>
           <a:r>
             <a:rPr lang="en-US" dirty="0" smtClean="0"/>
-            <a:t>Gaussian Linear A , u &amp; Decay, Close BC</a:t>
+            <a:t>Gaussian Linear A , u &amp; Decay, </a:t>
+          </a:r>
+          <a:r>
+            <a:rPr lang="en-US" dirty="0" smtClean="0"/>
+            <a:t>Active </a:t>
+          </a:r>
+          <a:r>
+            <a:rPr lang="en-US" dirty="0" smtClean="0"/>
+            <a:t>BC</a:t>
           </a:r>
           <a:endParaRPr lang="en-US" dirty="0"/>
         </a:p>
@@ -6309,6 +6441,13 @@
         </dgm:presLayoutVars>
       </dgm:prSet>
       <dgm:spPr/>
+      <dgm:t>
+        <a:bodyPr/>
+        <a:lstStyle/>
+        <a:p>
+          <a:endParaRPr lang="en-US"/>
+        </a:p>
+      </dgm:t>
     </dgm:pt>
     <dgm:pt modelId="{0B34A907-D616-41BD-ABB5-FFD2A4AD9FC0}" type="pres">
       <dgm:prSet presAssocID="{B6CF3427-DE35-49D4-8AE6-E8505ACF0A22}" presName="compositeNode" presStyleCnt="0">
@@ -6442,14 +6581,14 @@
     </dgm:pt>
   </dgm:ptLst>
   <dgm:cxnLst>
+    <dgm:cxn modelId="{4BC04753-0B79-4C66-BAE3-6A6157CBFC94}" type="presOf" srcId="{B6CF3427-DE35-49D4-8AE6-E8505ACF0A22}" destId="{F154D92C-8AFE-4A13-9C4A-945DDA5332D5}" srcOrd="0" destOrd="0" presId="urn:microsoft.com/office/officeart/2005/8/layout/hProcess7"/>
     <dgm:cxn modelId="{6C38F71A-F415-4159-A213-6055C61C5ED4}" type="presOf" srcId="{B6CF3427-DE35-49D4-8AE6-E8505ACF0A22}" destId="{32987979-9A1A-4366-AD61-07DBB5852CB5}" srcOrd="1" destOrd="0" presId="urn:microsoft.com/office/officeart/2005/8/layout/hProcess7"/>
-    <dgm:cxn modelId="{4BC04753-0B79-4C66-BAE3-6A6157CBFC94}" type="presOf" srcId="{B6CF3427-DE35-49D4-8AE6-E8505ACF0A22}" destId="{F154D92C-8AFE-4A13-9C4A-945DDA5332D5}" srcOrd="0" destOrd="0" presId="urn:microsoft.com/office/officeart/2005/8/layout/hProcess7"/>
     <dgm:cxn modelId="{00B8D889-F936-4780-A8FF-66F222E105D1}" type="presOf" srcId="{6BAA0EE4-E216-4DFE-8098-6F29AB1DF33F}" destId="{B01EA3BF-ADC4-4E7A-B35F-0E1BB6C7EBDE}" srcOrd="0" destOrd="0" presId="urn:microsoft.com/office/officeart/2005/8/layout/hProcess7"/>
     <dgm:cxn modelId="{E8B1DC5B-7552-4019-A0B9-9333730C693E}" type="presOf" srcId="{95C7ECCB-CDE3-44F3-B85D-ECEF206F000D}" destId="{211EA36C-963B-420E-A84D-E62101262AC8}" srcOrd="1" destOrd="0" presId="urn:microsoft.com/office/officeart/2005/8/layout/hProcess7"/>
     <dgm:cxn modelId="{78242A72-59B3-4393-AEEF-1E9777177199}" srcId="{3FB6E0CD-43CC-45AE-9F96-AEDB07B74290}" destId="{95C7ECCB-CDE3-44F3-B85D-ECEF206F000D}" srcOrd="1" destOrd="0" parTransId="{9BB3B48E-EE10-4543-86C4-F517795A17B3}" sibTransId="{5C9A649E-3A68-47C6-B3A2-E517D2EFEE0D}"/>
     <dgm:cxn modelId="{F64AD2A9-66B2-4844-BF95-08AD01E2F0CE}" type="presOf" srcId="{95C7ECCB-CDE3-44F3-B85D-ECEF206F000D}" destId="{82A4B1D1-615B-4DA5-86E2-52960FEDF681}" srcOrd="0" destOrd="0" presId="urn:microsoft.com/office/officeart/2005/8/layout/hProcess7"/>
+    <dgm:cxn modelId="{4543E9B6-5FFB-4058-9D62-7710B995642D}" srcId="{B6CF3427-DE35-49D4-8AE6-E8505ACF0A22}" destId="{6BAA0EE4-E216-4DFE-8098-6F29AB1DF33F}" srcOrd="0" destOrd="0" parTransId="{77AD5A4C-0EA8-4F6D-87E0-6C297D313883}" sibTransId="{3FD1894A-ED39-4FD5-A2A4-5881EAA4DA7F}"/>
     <dgm:cxn modelId="{4413EE33-0A83-4554-A523-82F7EB043962}" type="presOf" srcId="{CED13FC5-B4FC-4E9E-8936-C1B295C3ACF4}" destId="{0EB3E76F-394C-4E6D-B62E-5EAA3F6D5152}" srcOrd="0" destOrd="0" presId="urn:microsoft.com/office/officeart/2005/8/layout/hProcess7"/>
-    <dgm:cxn modelId="{4543E9B6-5FFB-4058-9D62-7710B995642D}" srcId="{B6CF3427-DE35-49D4-8AE6-E8505ACF0A22}" destId="{6BAA0EE4-E216-4DFE-8098-6F29AB1DF33F}" srcOrd="0" destOrd="0" parTransId="{77AD5A4C-0EA8-4F6D-87E0-6C297D313883}" sibTransId="{3FD1894A-ED39-4FD5-A2A4-5881EAA4DA7F}"/>
     <dgm:cxn modelId="{D2289952-1418-4A7A-84EE-EA9DE9A7F740}" srcId="{95C7ECCB-CDE3-44F3-B85D-ECEF206F000D}" destId="{CED13FC5-B4FC-4E9E-8936-C1B295C3ACF4}" srcOrd="0" destOrd="0" parTransId="{03A6608A-61B7-4AC3-8763-597A23137726}" sibTransId="{43B4066C-DBAC-4037-8400-E6B4622EBDE4}"/>
     <dgm:cxn modelId="{B67831B5-92EF-4471-A3ED-59144925BA3C}" srcId="{3FB6E0CD-43CC-45AE-9F96-AEDB07B74290}" destId="{B6CF3427-DE35-49D4-8AE6-E8505ACF0A22}" srcOrd="0" destOrd="0" parTransId="{A9D75665-A6CD-4D06-B112-8EADD3F1DC8E}" sibTransId="{B1723CA1-20C8-4EC0-BF3C-E90C7EF96159}"/>
     <dgm:cxn modelId="{4A6D6B38-CB27-4F83-AB3A-CAD22D02FC4E}" type="presOf" srcId="{3FB6E0CD-43CC-45AE-9F96-AEDB07B74290}" destId="{783AE301-0B7B-45D8-971F-96A0627557D0}" srcOrd="0" destOrd="0" presId="urn:microsoft.com/office/officeart/2005/8/layout/hProcess7"/>
@@ -6558,7 +6697,23 @@
                 <a:schemeClr val="tx1"/>
               </a:solidFill>
             </a:rPr>
-            <a:t>Gaussian Linear A, u,&amp; K, Close BC</a:t>
+            <a:t>Gaussian Linear A, u,&amp; K, </a:t>
+          </a:r>
+          <a:r>
+            <a:rPr lang="en-US" dirty="0" smtClean="0">
+              <a:solidFill>
+                <a:schemeClr val="tx1"/>
+              </a:solidFill>
+            </a:rPr>
+            <a:t>Active </a:t>
+          </a:r>
+          <a:r>
+            <a:rPr lang="en-US" dirty="0" smtClean="0">
+              <a:solidFill>
+                <a:schemeClr val="tx1"/>
+              </a:solidFill>
+            </a:rPr>
+            <a:t>BC</a:t>
           </a:r>
           <a:endParaRPr lang="en-US" dirty="0">
             <a:solidFill>
@@ -6662,7 +6817,15 @@
                 <a:schemeClr val="tx1"/>
               </a:solidFill>
             </a:rPr>
-            <a:t>Close BC</a:t>
+            <a:t>Active </a:t>
+          </a:r>
+          <a:r>
+            <a:rPr lang="en-US" dirty="0" smtClean="0">
+              <a:solidFill>
+                <a:schemeClr val="tx1"/>
+              </a:solidFill>
+            </a:rPr>
+            <a:t>BC</a:t>
           </a:r>
           <a:endParaRPr lang="en-US" dirty="0">
             <a:solidFill>
@@ -6801,7 +6964,15 @@
                 <a:schemeClr val="tx1"/>
               </a:solidFill>
             </a:rPr>
-            <a:t>Close BC</a:t>
+            <a:t>Active </a:t>
+          </a:r>
+          <a:r>
+            <a:rPr lang="en-US" dirty="0" smtClean="0">
+              <a:solidFill>
+                <a:schemeClr val="tx1"/>
+              </a:solidFill>
+            </a:rPr>
+            <a:t>BC</a:t>
           </a:r>
           <a:endParaRPr lang="en-US" dirty="0">
             <a:solidFill>
@@ -6842,6 +7013,13 @@
         </dgm:presLayoutVars>
       </dgm:prSet>
       <dgm:spPr/>
+      <dgm:t>
+        <a:bodyPr/>
+        <a:lstStyle/>
+        <a:p>
+          <a:endParaRPr lang="en-US"/>
+        </a:p>
+      </dgm:t>
     </dgm:pt>
     <dgm:pt modelId="{0B34A907-D616-41BD-ABB5-FFD2A4AD9FC0}" type="pres">
       <dgm:prSet presAssocID="{B6CF3427-DE35-49D4-8AE6-E8505ACF0A22}" presName="compositeNode" presStyleCnt="0">
@@ -7014,6 +7192,13 @@
     <dgm:pt modelId="{42C0DFB8-4235-4D2A-A923-9C6F2C44D059}" type="pres">
       <dgm:prSet presAssocID="{12EBBC24-6166-48F9-AABB-828B42136B52}" presName="bgRect" presStyleLbl="node1" presStyleIdx="2" presStyleCnt="3"/>
       <dgm:spPr/>
+      <dgm:t>
+        <a:bodyPr/>
+        <a:lstStyle/>
+        <a:p>
+          <a:endParaRPr lang="en-US"/>
+        </a:p>
+      </dgm:t>
     </dgm:pt>
     <dgm:pt modelId="{26D2E5AE-75ED-49E7-A5F5-10D30156204E}" type="pres">
       <dgm:prSet presAssocID="{12EBBC24-6166-48F9-AABB-828B42136B52}" presName="parentNode" presStyleLbl="node1" presStyleIdx="2" presStyleCnt="3">
@@ -7023,6 +7208,13 @@
         </dgm:presLayoutVars>
       </dgm:prSet>
       <dgm:spPr/>
+      <dgm:t>
+        <a:bodyPr/>
+        <a:lstStyle/>
+        <a:p>
+          <a:endParaRPr lang="en-US"/>
+        </a:p>
+      </dgm:t>
     </dgm:pt>
     <dgm:pt modelId="{15E3EBF4-631A-4E76-8BC3-2A68EC21970F}" type="pres">
       <dgm:prSet presAssocID="{12EBBC24-6166-48F9-AABB-828B42136B52}" presName="childNode" presStyleLbl="node1" presStyleIdx="2" presStyleCnt="3">
@@ -7031,27 +7223,34 @@
         </dgm:presLayoutVars>
       </dgm:prSet>
       <dgm:spPr/>
+      <dgm:t>
+        <a:bodyPr/>
+        <a:lstStyle/>
+        <a:p>
+          <a:endParaRPr lang="en-US"/>
+        </a:p>
+      </dgm:t>
     </dgm:pt>
   </dgm:ptLst>
   <dgm:cxnLst>
     <dgm:cxn modelId="{71A65D89-D35D-43BB-AEF6-5E161E02E043}" type="presOf" srcId="{95C7ECCB-CDE3-44F3-B85D-ECEF206F000D}" destId="{82A4B1D1-615B-4DA5-86E2-52960FEDF681}" srcOrd="0" destOrd="0" presId="urn:microsoft.com/office/officeart/2005/8/layout/hProcess7"/>
+    <dgm:cxn modelId="{B67831B5-92EF-4471-A3ED-59144925BA3C}" srcId="{3FB6E0CD-43CC-45AE-9F96-AEDB07B74290}" destId="{B6CF3427-DE35-49D4-8AE6-E8505ACF0A22}" srcOrd="0" destOrd="0" parTransId="{A9D75665-A6CD-4D06-B112-8EADD3F1DC8E}" sibTransId="{B1723CA1-20C8-4EC0-BF3C-E90C7EF96159}"/>
+    <dgm:cxn modelId="{6E7EEFE6-EA8F-4511-B661-E101658CF024}" srcId="{12EBBC24-6166-48F9-AABB-828B42136B52}" destId="{42F98159-BBD7-4F88-879B-630D4FC2ABA0}" srcOrd="0" destOrd="0" parTransId="{E905F8A9-AC11-4149-B383-391E04B7E689}" sibTransId="{04B30891-294F-4DFB-B468-27E7C971EC60}"/>
+    <dgm:cxn modelId="{E3FF0B50-B552-43CE-BBC9-E340A1348EC8}" type="presOf" srcId="{95F878E0-6DFB-483C-93F0-73FCA9479B79}" destId="{15E3EBF4-631A-4E76-8BC3-2A68EC21970F}" srcOrd="0" destOrd="1" presId="urn:microsoft.com/office/officeart/2005/8/layout/hProcess7"/>
+    <dgm:cxn modelId="{02367509-76D4-42BF-9826-2C29C1CD61C7}" type="presOf" srcId="{3FB6E0CD-43CC-45AE-9F96-AEDB07B74290}" destId="{783AE301-0B7B-45D8-971F-96A0627557D0}" srcOrd="0" destOrd="0" presId="urn:microsoft.com/office/officeart/2005/8/layout/hProcess7"/>
+    <dgm:cxn modelId="{AE200DFE-EA37-42E8-9E06-93FED45B1A56}" type="presOf" srcId="{6BAA0EE4-E216-4DFE-8098-6F29AB1DF33F}" destId="{B01EA3BF-ADC4-4E7A-B35F-0E1BB6C7EBDE}" srcOrd="0" destOrd="0" presId="urn:microsoft.com/office/officeart/2005/8/layout/hProcess7"/>
+    <dgm:cxn modelId="{5CF097AF-A2B8-4B99-BCE0-44046D7D3553}" srcId="{3FB6E0CD-43CC-45AE-9F96-AEDB07B74290}" destId="{12EBBC24-6166-48F9-AABB-828B42136B52}" srcOrd="2" destOrd="0" parTransId="{CE40D309-FAEE-4C34-AF7C-B7F7BBDEBE3D}" sibTransId="{0F52791B-F754-479D-B629-488C1C32A323}"/>
+    <dgm:cxn modelId="{96269B0E-7E20-4237-A6EB-FC8F15DF53BD}" srcId="{12EBBC24-6166-48F9-AABB-828B42136B52}" destId="{95F878E0-6DFB-483C-93F0-73FCA9479B79}" srcOrd="1" destOrd="0" parTransId="{6A4372FF-07BF-49A7-B9F3-78EF9133C61F}" sibTransId="{DE6F8AC1-6CF4-43CB-8F5B-A81216BE9234}"/>
+    <dgm:cxn modelId="{8DBD281D-AC14-4D85-89AC-5DC0D6E5190B}" type="presOf" srcId="{B6CF3427-DE35-49D4-8AE6-E8505ACF0A22}" destId="{32987979-9A1A-4366-AD61-07DBB5852CB5}" srcOrd="1" destOrd="0" presId="urn:microsoft.com/office/officeart/2005/8/layout/hProcess7"/>
+    <dgm:cxn modelId="{B6003049-BF6A-4773-91FE-4BCADA3D8F11}" type="presOf" srcId="{95C7ECCB-CDE3-44F3-B85D-ECEF206F000D}" destId="{211EA36C-963B-420E-A84D-E62101262AC8}" srcOrd="1" destOrd="0" presId="urn:microsoft.com/office/officeart/2005/8/layout/hProcess7"/>
+    <dgm:cxn modelId="{4543E9B6-5FFB-4058-9D62-7710B995642D}" srcId="{B6CF3427-DE35-49D4-8AE6-E8505ACF0A22}" destId="{6BAA0EE4-E216-4DFE-8098-6F29AB1DF33F}" srcOrd="0" destOrd="0" parTransId="{77AD5A4C-0EA8-4F6D-87E0-6C297D313883}" sibTransId="{3FD1894A-ED39-4FD5-A2A4-5881EAA4DA7F}"/>
+    <dgm:cxn modelId="{78242A72-59B3-4393-AEEF-1E9777177199}" srcId="{3FB6E0CD-43CC-45AE-9F96-AEDB07B74290}" destId="{95C7ECCB-CDE3-44F3-B85D-ECEF206F000D}" srcOrd="1" destOrd="0" parTransId="{9BB3B48E-EE10-4543-86C4-F517795A17B3}" sibTransId="{5C9A649E-3A68-47C6-B3A2-E517D2EFEE0D}"/>
     <dgm:cxn modelId="{CDEBA5DB-637E-47F7-94C3-A66B954E36C7}" type="presOf" srcId="{12EBBC24-6166-48F9-AABB-828B42136B52}" destId="{42C0DFB8-4235-4D2A-A923-9C6F2C44D059}" srcOrd="0" destOrd="0" presId="urn:microsoft.com/office/officeart/2005/8/layout/hProcess7"/>
-    <dgm:cxn modelId="{6E7EEFE6-EA8F-4511-B661-E101658CF024}" srcId="{12EBBC24-6166-48F9-AABB-828B42136B52}" destId="{42F98159-BBD7-4F88-879B-630D4FC2ABA0}" srcOrd="0" destOrd="0" parTransId="{E905F8A9-AC11-4149-B383-391E04B7E689}" sibTransId="{04B30891-294F-4DFB-B468-27E7C971EC60}"/>
-    <dgm:cxn modelId="{B6003049-BF6A-4773-91FE-4BCADA3D8F11}" type="presOf" srcId="{95C7ECCB-CDE3-44F3-B85D-ECEF206F000D}" destId="{211EA36C-963B-420E-A84D-E62101262AC8}" srcOrd="1" destOrd="0" presId="urn:microsoft.com/office/officeart/2005/8/layout/hProcess7"/>
+    <dgm:cxn modelId="{7096A6C2-4E10-46FC-81FE-5CF010C45618}" type="presOf" srcId="{12EBBC24-6166-48F9-AABB-828B42136B52}" destId="{26D2E5AE-75ED-49E7-A5F5-10D30156204E}" srcOrd="1" destOrd="0" presId="urn:microsoft.com/office/officeart/2005/8/layout/hProcess7"/>
     <dgm:cxn modelId="{D2289952-1418-4A7A-84EE-EA9DE9A7F740}" srcId="{95C7ECCB-CDE3-44F3-B85D-ECEF206F000D}" destId="{CED13FC5-B4FC-4E9E-8936-C1B295C3ACF4}" srcOrd="0" destOrd="0" parTransId="{03A6608A-61B7-4AC3-8763-597A23137726}" sibTransId="{43B4066C-DBAC-4037-8400-E6B4622EBDE4}"/>
-    <dgm:cxn modelId="{B67831B5-92EF-4471-A3ED-59144925BA3C}" srcId="{3FB6E0CD-43CC-45AE-9F96-AEDB07B74290}" destId="{B6CF3427-DE35-49D4-8AE6-E8505ACF0A22}" srcOrd="0" destOrd="0" parTransId="{A9D75665-A6CD-4D06-B112-8EADD3F1DC8E}" sibTransId="{B1723CA1-20C8-4EC0-BF3C-E90C7EF96159}"/>
+    <dgm:cxn modelId="{6A59AFEB-A8CB-4D37-8406-AB3F5F5C182A}" type="presOf" srcId="{CED13FC5-B4FC-4E9E-8936-C1B295C3ACF4}" destId="{0EB3E76F-394C-4E6D-B62E-5EAA3F6D5152}" srcOrd="0" destOrd="0" presId="urn:microsoft.com/office/officeart/2005/8/layout/hProcess7"/>
+    <dgm:cxn modelId="{3B2238DB-A672-4407-9790-7CCB4A92F367}" type="presOf" srcId="{B6CF3427-DE35-49D4-8AE6-E8505ACF0A22}" destId="{F154D92C-8AFE-4A13-9C4A-945DDA5332D5}" srcOrd="0" destOrd="0" presId="urn:microsoft.com/office/officeart/2005/8/layout/hProcess7"/>
     <dgm:cxn modelId="{C26CB16E-5579-466B-88E9-BEE1B3C3FDAD}" type="presOf" srcId="{42F98159-BBD7-4F88-879B-630D4FC2ABA0}" destId="{15E3EBF4-631A-4E76-8BC3-2A68EC21970F}" srcOrd="0" destOrd="0" presId="urn:microsoft.com/office/officeart/2005/8/layout/hProcess7"/>
-    <dgm:cxn modelId="{02367509-76D4-42BF-9826-2C29C1CD61C7}" type="presOf" srcId="{3FB6E0CD-43CC-45AE-9F96-AEDB07B74290}" destId="{783AE301-0B7B-45D8-971F-96A0627557D0}" srcOrd="0" destOrd="0" presId="urn:microsoft.com/office/officeart/2005/8/layout/hProcess7"/>
-    <dgm:cxn modelId="{6A59AFEB-A8CB-4D37-8406-AB3F5F5C182A}" type="presOf" srcId="{CED13FC5-B4FC-4E9E-8936-C1B295C3ACF4}" destId="{0EB3E76F-394C-4E6D-B62E-5EAA3F6D5152}" srcOrd="0" destOrd="0" presId="urn:microsoft.com/office/officeart/2005/8/layout/hProcess7"/>
-    <dgm:cxn modelId="{7096A6C2-4E10-46FC-81FE-5CF010C45618}" type="presOf" srcId="{12EBBC24-6166-48F9-AABB-828B42136B52}" destId="{26D2E5AE-75ED-49E7-A5F5-10D30156204E}" srcOrd="1" destOrd="0" presId="urn:microsoft.com/office/officeart/2005/8/layout/hProcess7"/>
-    <dgm:cxn modelId="{96269B0E-7E20-4237-A6EB-FC8F15DF53BD}" srcId="{12EBBC24-6166-48F9-AABB-828B42136B52}" destId="{95F878E0-6DFB-483C-93F0-73FCA9479B79}" srcOrd="1" destOrd="0" parTransId="{6A4372FF-07BF-49A7-B9F3-78EF9133C61F}" sibTransId="{DE6F8AC1-6CF4-43CB-8F5B-A81216BE9234}"/>
-    <dgm:cxn modelId="{3B2238DB-A672-4407-9790-7CCB4A92F367}" type="presOf" srcId="{B6CF3427-DE35-49D4-8AE6-E8505ACF0A22}" destId="{F154D92C-8AFE-4A13-9C4A-945DDA5332D5}" srcOrd="0" destOrd="0" presId="urn:microsoft.com/office/officeart/2005/8/layout/hProcess7"/>
-    <dgm:cxn modelId="{8DBD281D-AC14-4D85-89AC-5DC0D6E5190B}" type="presOf" srcId="{B6CF3427-DE35-49D4-8AE6-E8505ACF0A22}" destId="{32987979-9A1A-4366-AD61-07DBB5852CB5}" srcOrd="1" destOrd="0" presId="urn:microsoft.com/office/officeart/2005/8/layout/hProcess7"/>
-    <dgm:cxn modelId="{AE200DFE-EA37-42E8-9E06-93FED45B1A56}" type="presOf" srcId="{6BAA0EE4-E216-4DFE-8098-6F29AB1DF33F}" destId="{B01EA3BF-ADC4-4E7A-B35F-0E1BB6C7EBDE}" srcOrd="0" destOrd="0" presId="urn:microsoft.com/office/officeart/2005/8/layout/hProcess7"/>
-    <dgm:cxn modelId="{E3FF0B50-B552-43CE-BBC9-E340A1348EC8}" type="presOf" srcId="{95F878E0-6DFB-483C-93F0-73FCA9479B79}" destId="{15E3EBF4-631A-4E76-8BC3-2A68EC21970F}" srcOrd="0" destOrd="1" presId="urn:microsoft.com/office/officeart/2005/8/layout/hProcess7"/>
-    <dgm:cxn modelId="{5CF097AF-A2B8-4B99-BCE0-44046D7D3553}" srcId="{3FB6E0CD-43CC-45AE-9F96-AEDB07B74290}" destId="{12EBBC24-6166-48F9-AABB-828B42136B52}" srcOrd="2" destOrd="0" parTransId="{CE40D309-FAEE-4C34-AF7C-B7F7BBDEBE3D}" sibTransId="{0F52791B-F754-479D-B629-488C1C32A323}"/>
-    <dgm:cxn modelId="{78242A72-59B3-4393-AEEF-1E9777177199}" srcId="{3FB6E0CD-43CC-45AE-9F96-AEDB07B74290}" destId="{95C7ECCB-CDE3-44F3-B85D-ECEF206F000D}" srcOrd="1" destOrd="0" parTransId="{9BB3B48E-EE10-4543-86C4-F517795A17B3}" sibTransId="{5C9A649E-3A68-47C6-B3A2-E517D2EFEE0D}"/>
-    <dgm:cxn modelId="{4543E9B6-5FFB-4058-9D62-7710B995642D}" srcId="{B6CF3427-DE35-49D4-8AE6-E8505ACF0A22}" destId="{6BAA0EE4-E216-4DFE-8098-6F29AB1DF33F}" srcOrd="0" destOrd="0" parTransId="{77AD5A4C-0EA8-4F6D-87E0-6C297D313883}" sibTransId="{3FD1894A-ED39-4FD5-A2A4-5881EAA4DA7F}"/>
     <dgm:cxn modelId="{88A75864-91BF-4C6C-8AA3-DB0D0986C8A9}" type="presParOf" srcId="{783AE301-0B7B-45D8-971F-96A0627557D0}" destId="{0B34A907-D616-41BD-ABB5-FFD2A4AD9FC0}" srcOrd="0" destOrd="0" presId="urn:microsoft.com/office/officeart/2005/8/layout/hProcess7"/>
     <dgm:cxn modelId="{C2FAD119-77BC-4000-B82E-D9F2436827BD}" type="presParOf" srcId="{0B34A907-D616-41BD-ABB5-FFD2A4AD9FC0}" destId="{F154D92C-8AFE-4A13-9C4A-945DDA5332D5}" srcOrd="0" destOrd="0" presId="urn:microsoft.com/office/officeart/2005/8/layout/hProcess7"/>
     <dgm:cxn modelId="{5040255A-4F42-4276-86D9-C8C33DD8469B}" type="presParOf" srcId="{0B34A907-D616-41BD-ABB5-FFD2A4AD9FC0}" destId="{32987979-9A1A-4366-AD61-07DBB5852CB5}" srcOrd="1" destOrd="0" presId="urn:microsoft.com/office/officeart/2005/8/layout/hProcess7"/>
@@ -7271,7 +7470,23 @@
                 <a:schemeClr val="tx1"/>
               </a:solidFill>
             </a:rPr>
-            <a:t>Gaussian Linear A , u, K &amp; Decay, Remote BC</a:t>
+            <a:t>Gaussian Linear A , u, K &amp; Decay, </a:t>
+          </a:r>
+          <a:r>
+            <a:rPr lang="en-US" dirty="0" smtClean="0">
+              <a:solidFill>
+                <a:schemeClr val="tx1"/>
+              </a:solidFill>
+            </a:rPr>
+            <a:t>Active </a:t>
+          </a:r>
+          <a:r>
+            <a:rPr lang="en-US" dirty="0" smtClean="0">
+              <a:solidFill>
+                <a:schemeClr val="tx1"/>
+              </a:solidFill>
+            </a:rPr>
+            <a:t>BC</a:t>
           </a:r>
           <a:endParaRPr lang="en-US" dirty="0">
             <a:solidFill>
@@ -7411,6 +7626,13 @@
         </dgm:presLayoutVars>
       </dgm:prSet>
       <dgm:spPr/>
+      <dgm:t>
+        <a:bodyPr/>
+        <a:lstStyle/>
+        <a:p>
+          <a:endParaRPr lang="en-US"/>
+        </a:p>
+      </dgm:t>
     </dgm:pt>
     <dgm:pt modelId="{0B34A907-D616-41BD-ABB5-FFD2A4AD9FC0}" type="pres">
       <dgm:prSet presAssocID="{B6CF3427-DE35-49D4-8AE6-E8505ACF0A22}" presName="compositeNode" presStyleCnt="0">
@@ -7583,6 +7805,13 @@
     <dgm:pt modelId="{84165458-A6EC-405B-A07B-BE4F63D9B3EE}" type="pres">
       <dgm:prSet presAssocID="{3A0CA1C0-37A6-4848-8C14-7297696229B0}" presName="bgRect" presStyleLbl="node1" presStyleIdx="2" presStyleCnt="3"/>
       <dgm:spPr/>
+      <dgm:t>
+        <a:bodyPr/>
+        <a:lstStyle/>
+        <a:p>
+          <a:endParaRPr lang="en-US"/>
+        </a:p>
+      </dgm:t>
     </dgm:pt>
     <dgm:pt modelId="{398AEB02-39C6-42D0-9A78-6C918A6CE7D5}" type="pres">
       <dgm:prSet presAssocID="{3A0CA1C0-37A6-4848-8C14-7297696229B0}" presName="parentNode" presStyleLbl="node1" presStyleIdx="2" presStyleCnt="3">
@@ -7592,6 +7821,13 @@
         </dgm:presLayoutVars>
       </dgm:prSet>
       <dgm:spPr/>
+      <dgm:t>
+        <a:bodyPr/>
+        <a:lstStyle/>
+        <a:p>
+          <a:endParaRPr lang="en-US"/>
+        </a:p>
+      </dgm:t>
     </dgm:pt>
     <dgm:pt modelId="{A7A7FFED-7A75-4258-AFCE-FBC0D24D00B6}" type="pres">
       <dgm:prSet presAssocID="{3A0CA1C0-37A6-4848-8C14-7297696229B0}" presName="childNode" presStyleLbl="node1" presStyleIdx="2" presStyleCnt="3">
@@ -7610,22 +7846,22 @@
     </dgm:pt>
   </dgm:ptLst>
   <dgm:cxnLst>
-    <dgm:cxn modelId="{0530F3D5-AA0B-4967-BEFA-C20B480B61BE}" srcId="{3FB6E0CD-43CC-45AE-9F96-AEDB07B74290}" destId="{3A0CA1C0-37A6-4848-8C14-7297696229B0}" srcOrd="2" destOrd="0" parTransId="{5381DAFE-095B-48E5-A697-2CDB66990BEF}" sibTransId="{88F9D7CB-D417-4A0F-B031-946FA6B26852}"/>
     <dgm:cxn modelId="{E8345D79-0F7C-4B21-BC4D-66720BAE956D}" type="presOf" srcId="{B6CF3427-DE35-49D4-8AE6-E8505ACF0A22}" destId="{F154D92C-8AFE-4A13-9C4A-945DDA5332D5}" srcOrd="0" destOrd="0" presId="urn:microsoft.com/office/officeart/2005/8/layout/hProcess7"/>
-    <dgm:cxn modelId="{D2289952-1418-4A7A-84EE-EA9DE9A7F740}" srcId="{95C7ECCB-CDE3-44F3-B85D-ECEF206F000D}" destId="{CED13FC5-B4FC-4E9E-8936-C1B295C3ACF4}" srcOrd="0" destOrd="0" parTransId="{03A6608A-61B7-4AC3-8763-597A23137726}" sibTransId="{43B4066C-DBAC-4037-8400-E6B4622EBDE4}"/>
+    <dgm:cxn modelId="{C45CCB45-E916-4456-8469-A1B6D9FD9A5B}" type="presOf" srcId="{3A0CA1C0-37A6-4848-8C14-7297696229B0}" destId="{84165458-A6EC-405B-A07B-BE4F63D9B3EE}" srcOrd="0" destOrd="0" presId="urn:microsoft.com/office/officeart/2005/8/layout/hProcess7"/>
     <dgm:cxn modelId="{B67831B5-92EF-4471-A3ED-59144925BA3C}" srcId="{3FB6E0CD-43CC-45AE-9F96-AEDB07B74290}" destId="{B6CF3427-DE35-49D4-8AE6-E8505ACF0A22}" srcOrd="0" destOrd="0" parTransId="{A9D75665-A6CD-4D06-B112-8EADD3F1DC8E}" sibTransId="{B1723CA1-20C8-4EC0-BF3C-E90C7EF96159}"/>
-    <dgm:cxn modelId="{EC0D1835-2351-4CDA-AC53-4312AC838646}" type="presOf" srcId="{95C7ECCB-CDE3-44F3-B85D-ECEF206F000D}" destId="{82A4B1D1-615B-4DA5-86E2-52960FEDF681}" srcOrd="0" destOrd="0" presId="urn:microsoft.com/office/officeart/2005/8/layout/hProcess7"/>
+    <dgm:cxn modelId="{F434B80B-702A-4718-973B-DE79E4CA2D9B}" type="presOf" srcId="{6BAA0EE4-E216-4DFE-8098-6F29AB1DF33F}" destId="{B01EA3BF-ADC4-4E7A-B35F-0E1BB6C7EBDE}" srcOrd="0" destOrd="0" presId="urn:microsoft.com/office/officeart/2005/8/layout/hProcess7"/>
+    <dgm:cxn modelId="{34E895C1-A961-4F38-A140-B29CE79E45BB}" type="presOf" srcId="{CED13FC5-B4FC-4E9E-8936-C1B295C3ACF4}" destId="{0EB3E76F-394C-4E6D-B62E-5EAA3F6D5152}" srcOrd="0" destOrd="0" presId="urn:microsoft.com/office/officeart/2005/8/layout/hProcess7"/>
     <dgm:cxn modelId="{8030C36E-0425-40C9-939B-EAC1AFA89D9A}" srcId="{3A0CA1C0-37A6-4848-8C14-7297696229B0}" destId="{1D7C19CA-341A-4958-A577-435C4AF63710}" srcOrd="0" destOrd="0" parTransId="{160BF78B-E1E3-4A15-8B14-D41B149992B2}" sibTransId="{8B722576-35BE-4C0B-A274-36ED5C13BD63}"/>
     <dgm:cxn modelId="{05305F2C-0E0C-4CE4-8E1F-CAE5AC0A5956}" type="presOf" srcId="{3FB6E0CD-43CC-45AE-9F96-AEDB07B74290}" destId="{783AE301-0B7B-45D8-971F-96A0627557D0}" srcOrd="0" destOrd="0" presId="urn:microsoft.com/office/officeart/2005/8/layout/hProcess7"/>
-    <dgm:cxn modelId="{34E895C1-A961-4F38-A140-B29CE79E45BB}" type="presOf" srcId="{CED13FC5-B4FC-4E9E-8936-C1B295C3ACF4}" destId="{0EB3E76F-394C-4E6D-B62E-5EAA3F6D5152}" srcOrd="0" destOrd="0" presId="urn:microsoft.com/office/officeart/2005/8/layout/hProcess7"/>
+    <dgm:cxn modelId="{199D4004-210A-45EF-AAEE-8018BCBB8532}" type="presOf" srcId="{B6CF3427-DE35-49D4-8AE6-E8505ACF0A22}" destId="{32987979-9A1A-4366-AD61-07DBB5852CB5}" srcOrd="1" destOrd="0" presId="urn:microsoft.com/office/officeart/2005/8/layout/hProcess7"/>
     <dgm:cxn modelId="{B6CFFCD0-77FB-4A2A-99CF-71046B334CC5}" type="presOf" srcId="{95C7ECCB-CDE3-44F3-B85D-ECEF206F000D}" destId="{211EA36C-963B-420E-A84D-E62101262AC8}" srcOrd="1" destOrd="0" presId="urn:microsoft.com/office/officeart/2005/8/layout/hProcess7"/>
-    <dgm:cxn modelId="{0DABDB0F-3A5B-4B66-B387-CC3931F07250}" type="presOf" srcId="{1D7C19CA-341A-4958-A577-435C4AF63710}" destId="{A7A7FFED-7A75-4258-AFCE-FBC0D24D00B6}" srcOrd="0" destOrd="0" presId="urn:microsoft.com/office/officeart/2005/8/layout/hProcess7"/>
-    <dgm:cxn modelId="{C45CCB45-E916-4456-8469-A1B6D9FD9A5B}" type="presOf" srcId="{3A0CA1C0-37A6-4848-8C14-7297696229B0}" destId="{84165458-A6EC-405B-A07B-BE4F63D9B3EE}" srcOrd="0" destOrd="0" presId="urn:microsoft.com/office/officeart/2005/8/layout/hProcess7"/>
-    <dgm:cxn modelId="{199D4004-210A-45EF-AAEE-8018BCBB8532}" type="presOf" srcId="{B6CF3427-DE35-49D4-8AE6-E8505ACF0A22}" destId="{32987979-9A1A-4366-AD61-07DBB5852CB5}" srcOrd="1" destOrd="0" presId="urn:microsoft.com/office/officeart/2005/8/layout/hProcess7"/>
-    <dgm:cxn modelId="{78242A72-59B3-4393-AEEF-1E9777177199}" srcId="{3FB6E0CD-43CC-45AE-9F96-AEDB07B74290}" destId="{95C7ECCB-CDE3-44F3-B85D-ECEF206F000D}" srcOrd="1" destOrd="0" parTransId="{9BB3B48E-EE10-4543-86C4-F517795A17B3}" sibTransId="{5C9A649E-3A68-47C6-B3A2-E517D2EFEE0D}"/>
+    <dgm:cxn modelId="{0530F3D5-AA0B-4967-BEFA-C20B480B61BE}" srcId="{3FB6E0CD-43CC-45AE-9F96-AEDB07B74290}" destId="{3A0CA1C0-37A6-4848-8C14-7297696229B0}" srcOrd="2" destOrd="0" parTransId="{5381DAFE-095B-48E5-A697-2CDB66990BEF}" sibTransId="{88F9D7CB-D417-4A0F-B031-946FA6B26852}"/>
     <dgm:cxn modelId="{2548F2DE-E19F-4CA0-ABB3-CABE028BE9DC}" type="presOf" srcId="{3A0CA1C0-37A6-4848-8C14-7297696229B0}" destId="{398AEB02-39C6-42D0-9A78-6C918A6CE7D5}" srcOrd="1" destOrd="0" presId="urn:microsoft.com/office/officeart/2005/8/layout/hProcess7"/>
     <dgm:cxn modelId="{4543E9B6-5FFB-4058-9D62-7710B995642D}" srcId="{B6CF3427-DE35-49D4-8AE6-E8505ACF0A22}" destId="{6BAA0EE4-E216-4DFE-8098-6F29AB1DF33F}" srcOrd="0" destOrd="0" parTransId="{77AD5A4C-0EA8-4F6D-87E0-6C297D313883}" sibTransId="{3FD1894A-ED39-4FD5-A2A4-5881EAA4DA7F}"/>
-    <dgm:cxn modelId="{F434B80B-702A-4718-973B-DE79E4CA2D9B}" type="presOf" srcId="{6BAA0EE4-E216-4DFE-8098-6F29AB1DF33F}" destId="{B01EA3BF-ADC4-4E7A-B35F-0E1BB6C7EBDE}" srcOrd="0" destOrd="0" presId="urn:microsoft.com/office/officeart/2005/8/layout/hProcess7"/>
+    <dgm:cxn modelId="{78242A72-59B3-4393-AEEF-1E9777177199}" srcId="{3FB6E0CD-43CC-45AE-9F96-AEDB07B74290}" destId="{95C7ECCB-CDE3-44F3-B85D-ECEF206F000D}" srcOrd="1" destOrd="0" parTransId="{9BB3B48E-EE10-4543-86C4-F517795A17B3}" sibTransId="{5C9A649E-3A68-47C6-B3A2-E517D2EFEE0D}"/>
+    <dgm:cxn modelId="{D2289952-1418-4A7A-84EE-EA9DE9A7F740}" srcId="{95C7ECCB-CDE3-44F3-B85D-ECEF206F000D}" destId="{CED13FC5-B4FC-4E9E-8936-C1B295C3ACF4}" srcOrd="0" destOrd="0" parTransId="{03A6608A-61B7-4AC3-8763-597A23137726}" sibTransId="{43B4066C-DBAC-4037-8400-E6B4622EBDE4}"/>
+    <dgm:cxn modelId="{0DABDB0F-3A5B-4B66-B387-CC3931F07250}" type="presOf" srcId="{1D7C19CA-341A-4958-A577-435C4AF63710}" destId="{A7A7FFED-7A75-4258-AFCE-FBC0D24D00B6}" srcOrd="0" destOrd="0" presId="urn:microsoft.com/office/officeart/2005/8/layout/hProcess7"/>
+    <dgm:cxn modelId="{EC0D1835-2351-4CDA-AC53-4312AC838646}" type="presOf" srcId="{95C7ECCB-CDE3-44F3-B85D-ECEF206F000D}" destId="{82A4B1D1-615B-4DA5-86E2-52960FEDF681}" srcOrd="0" destOrd="0" presId="urn:microsoft.com/office/officeart/2005/8/layout/hProcess7"/>
     <dgm:cxn modelId="{3EA1A7A3-D827-4797-9BE2-ACE70763F531}" type="presParOf" srcId="{783AE301-0B7B-45D8-971F-96A0627557D0}" destId="{0B34A907-D616-41BD-ABB5-FFD2A4AD9FC0}" srcOrd="0" destOrd="0" presId="urn:microsoft.com/office/officeart/2005/8/layout/hProcess7"/>
     <dgm:cxn modelId="{35BE8BED-D980-4CA0-8557-E22952148EF9}" type="presParOf" srcId="{0B34A907-D616-41BD-ABB5-FFD2A4AD9FC0}" destId="{F154D92C-8AFE-4A13-9C4A-945DDA5332D5}" srcOrd="0" destOrd="0" presId="urn:microsoft.com/office/officeart/2005/8/layout/hProcess7"/>
     <dgm:cxn modelId="{919D2040-4339-45F0-A91E-42286CA55C62}" type="presParOf" srcId="{0B34A907-D616-41BD-ABB5-FFD2A4AD9FC0}" destId="{32987979-9A1A-4366-AD61-07DBB5852CB5}" srcOrd="1" destOrd="0" presId="urn:microsoft.com/office/officeart/2005/8/layout/hProcess7"/>
@@ -8165,7 +8401,15 @@
           </a:pPr>
           <a:r>
             <a:rPr lang="en-US" sz="1200" kern="1200" dirty="0" smtClean="0"/>
-            <a:t>Linear Flow Field Close BC</a:t>
+            <a:t>Linear Flow Field </a:t>
+          </a:r>
+          <a:r>
+            <a:rPr lang="en-US" sz="1200" kern="1200" dirty="0" smtClean="0"/>
+            <a:t>Active </a:t>
+          </a:r>
+          <a:r>
+            <a:rPr lang="en-US" sz="1200" kern="1200" dirty="0" smtClean="0"/>
+            <a:t>BC</a:t>
           </a:r>
           <a:endParaRPr lang="en-US" sz="1200" kern="1200" dirty="0"/>
         </a:p>
@@ -8675,7 +8919,28 @@
           </a:pPr>
           <a:r>
             <a:rPr lang="en-US" sz="1100" kern="1200" dirty="0" smtClean="0"/>
-            <a:t>Gaussian Linear A &amp; K, Close BC </a:t>
+            <a:t>Gaussian Linear A &amp; K, </a:t>
+          </a:r>
+          <a:r>
+            <a:rPr lang="en-US" sz="1100" kern="1200" dirty="0" smtClean="0"/>
+            <a:t>Active</a:t>
+          </a:r>
+        </a:p>
+        <a:p>
+          <a:pPr lvl="0" algn="l" defTabSz="488950">
+            <a:lnSpc>
+              <a:spcPct val="90000"/>
+            </a:lnSpc>
+            <a:spcBef>
+              <a:spcPct val="0"/>
+            </a:spcBef>
+            <a:spcAft>
+              <a:spcPct val="35000"/>
+            </a:spcAft>
+          </a:pPr>
+          <a:r>
+            <a:rPr lang="en-US" sz="1100" kern="1200" dirty="0" smtClean="0"/>
+            <a:t>BC </a:t>
           </a:r>
           <a:endParaRPr lang="en-US" sz="1100" kern="1200" dirty="0"/>
         </a:p>
@@ -8873,7 +9138,15 @@
           </a:pPr>
           <a:r>
             <a:rPr lang="en-US" sz="1100" kern="1200" dirty="0" smtClean="0"/>
-            <a:t>Linear Flow Field Close BC</a:t>
+            <a:t>Linear Flow Field </a:t>
+          </a:r>
+          <a:r>
+            <a:rPr lang="en-US" sz="1100" kern="1200" dirty="0" smtClean="0"/>
+            <a:t>Active </a:t>
+          </a:r>
+          <a:r>
+            <a:rPr lang="en-US" sz="1100" kern="1200" dirty="0" smtClean="0"/>
+            <a:t>BC</a:t>
           </a:r>
           <a:endParaRPr lang="en-US" sz="1100" kern="1200" dirty="0"/>
         </a:p>
@@ -9346,7 +9619,15 @@
           </a:pPr>
           <a:r>
             <a:rPr lang="en-US" sz="1300" kern="1200" dirty="0" smtClean="0"/>
-            <a:t>Gaussian Linear A , u &amp; Decay, Close BC</a:t>
+            <a:t>Gaussian Linear A , u &amp; Decay, </a:t>
+          </a:r>
+          <a:r>
+            <a:rPr lang="en-US" sz="1300" kern="1200" dirty="0" smtClean="0"/>
+            <a:t>Active </a:t>
+          </a:r>
+          <a:r>
+            <a:rPr lang="en-US" sz="1300" kern="1200" dirty="0" smtClean="0"/>
+            <a:t>BC</a:t>
           </a:r>
           <a:endParaRPr lang="en-US" sz="1300" kern="1200" dirty="0"/>
         </a:p>
@@ -9688,7 +9969,23 @@
                 <a:schemeClr val="tx1"/>
               </a:solidFill>
             </a:rPr>
-            <a:t>Gaussian Linear A, u,&amp; K, Close BC</a:t>
+            <a:t>Gaussian Linear A, u,&amp; K, </a:t>
+          </a:r>
+          <a:r>
+            <a:rPr lang="en-US" sz="1200" kern="1200" dirty="0" smtClean="0">
+              <a:solidFill>
+                <a:schemeClr val="tx1"/>
+              </a:solidFill>
+            </a:rPr>
+            <a:t>Active </a:t>
+          </a:r>
+          <a:r>
+            <a:rPr lang="en-US" sz="1200" kern="1200" dirty="0" smtClean="0">
+              <a:solidFill>
+                <a:schemeClr val="tx1"/>
+              </a:solidFill>
+            </a:rPr>
+            <a:t>BC</a:t>
           </a:r>
           <a:endParaRPr lang="en-US" sz="1200" kern="1200" dirty="0">
             <a:solidFill>
@@ -9905,7 +10202,15 @@
                 <a:schemeClr val="tx1"/>
               </a:solidFill>
             </a:rPr>
-            <a:t>Close BC</a:t>
+            <a:t>Active </a:t>
+          </a:r>
+          <a:r>
+            <a:rPr lang="en-US" sz="1200" kern="1200" dirty="0" smtClean="0">
+              <a:solidFill>
+                <a:schemeClr val="tx1"/>
+              </a:solidFill>
+            </a:rPr>
+            <a:t>BC</a:t>
           </a:r>
           <a:endParaRPr lang="en-US" sz="1200" kern="1200" dirty="0">
             <a:solidFill>
@@ -10127,7 +10432,15 @@
                 <a:schemeClr val="tx1"/>
               </a:solidFill>
             </a:rPr>
-            <a:t>Close BC</a:t>
+            <a:t>Active </a:t>
+          </a:r>
+          <a:r>
+            <a:rPr lang="en-US" sz="1200" kern="1200" dirty="0" smtClean="0">
+              <a:solidFill>
+                <a:schemeClr val="tx1"/>
+              </a:solidFill>
+            </a:rPr>
+            <a:t>BC</a:t>
           </a:r>
           <a:endParaRPr lang="en-US" sz="1200" kern="1200" dirty="0">
             <a:solidFill>
@@ -10479,7 +10792,23 @@
                 <a:schemeClr val="tx1"/>
               </a:solidFill>
             </a:rPr>
-            <a:t>Gaussian Linear A , u, K &amp; Decay, Remote BC</a:t>
+            <a:t>Gaussian Linear A , u, K &amp; Decay, </a:t>
+          </a:r>
+          <a:r>
+            <a:rPr lang="en-US" sz="1100" kern="1200" dirty="0" smtClean="0">
+              <a:solidFill>
+                <a:schemeClr val="tx1"/>
+              </a:solidFill>
+            </a:rPr>
+            <a:t>Active </a:t>
+          </a:r>
+          <a:r>
+            <a:rPr lang="en-US" sz="1100" kern="1200" dirty="0" smtClean="0">
+              <a:solidFill>
+                <a:schemeClr val="tx1"/>
+              </a:solidFill>
+            </a:rPr>
+            <a:t>BC</a:t>
           </a:r>
           <a:endParaRPr lang="en-US" sz="1100" kern="1200" dirty="0">
             <a:solidFill>
@@ -19108,7 +19437,7 @@
             <a:fld id="{1D8BD707-D9CF-40AE-B4C6-C98DA3205C09}" type="datetimeFigureOut">
               <a:rPr lang="en-US" smtClean="0"/>
               <a:pPr/>
-              <a:t>1/4/2011</a:t>
+              <a:t>1/11/2011</a:t>
             </a:fld>
             <a:endParaRPr lang="en-US" dirty="0"/>
           </a:p>
@@ -19275,7 +19604,7 @@
             <a:fld id="{1D8BD707-D9CF-40AE-B4C6-C98DA3205C09}" type="datetimeFigureOut">
               <a:rPr lang="en-US" smtClean="0"/>
               <a:pPr/>
-              <a:t>1/4/2011</a:t>
+              <a:t>1/11/2011</a:t>
             </a:fld>
             <a:endParaRPr lang="en-US" dirty="0"/>
           </a:p>
@@ -19452,7 +19781,7 @@
             <a:fld id="{1D8BD707-D9CF-40AE-B4C6-C98DA3205C09}" type="datetimeFigureOut">
               <a:rPr lang="en-US" smtClean="0"/>
               <a:pPr/>
-              <a:t>1/4/2011</a:t>
+              <a:t>1/11/2011</a:t>
             </a:fld>
             <a:endParaRPr lang="en-US" dirty="0"/>
           </a:p>
@@ -19619,7 +19948,7 @@
             <a:fld id="{1D8BD707-D9CF-40AE-B4C6-C98DA3205C09}" type="datetimeFigureOut">
               <a:rPr lang="en-US" smtClean="0"/>
               <a:pPr/>
-              <a:t>1/4/2011</a:t>
+              <a:t>1/11/2011</a:t>
             </a:fld>
             <a:endParaRPr lang="en-US" dirty="0"/>
           </a:p>
@@ -19862,7 +20191,7 @@
             <a:fld id="{1D8BD707-D9CF-40AE-B4C6-C98DA3205C09}" type="datetimeFigureOut">
               <a:rPr lang="en-US" smtClean="0"/>
               <a:pPr/>
-              <a:t>1/4/2011</a:t>
+              <a:t>1/11/2011</a:t>
             </a:fld>
             <a:endParaRPr lang="en-US" dirty="0"/>
           </a:p>
@@ -20147,7 +20476,7 @@
             <a:fld id="{1D8BD707-D9CF-40AE-B4C6-C98DA3205C09}" type="datetimeFigureOut">
               <a:rPr lang="en-US" smtClean="0"/>
               <a:pPr/>
-              <a:t>1/4/2011</a:t>
+              <a:t>1/11/2011</a:t>
             </a:fld>
             <a:endParaRPr lang="en-US" dirty="0"/>
           </a:p>
@@ -20566,7 +20895,7 @@
             <a:fld id="{1D8BD707-D9CF-40AE-B4C6-C98DA3205C09}" type="datetimeFigureOut">
               <a:rPr lang="en-US" smtClean="0"/>
               <a:pPr/>
-              <a:t>1/4/2011</a:t>
+              <a:t>1/11/2011</a:t>
             </a:fld>
             <a:endParaRPr lang="en-US" dirty="0"/>
           </a:p>
@@ -20681,7 +21010,7 @@
             <a:fld id="{1D8BD707-D9CF-40AE-B4C6-C98DA3205C09}" type="datetimeFigureOut">
               <a:rPr lang="en-US" smtClean="0"/>
               <a:pPr/>
-              <a:t>1/4/2011</a:t>
+              <a:t>1/11/2011</a:t>
             </a:fld>
             <a:endParaRPr lang="en-US" dirty="0"/>
           </a:p>
@@ -20773,7 +21102,7 @@
             <a:fld id="{1D8BD707-D9CF-40AE-B4C6-C98DA3205C09}" type="datetimeFigureOut">
               <a:rPr lang="en-US" smtClean="0"/>
               <a:pPr/>
-              <a:t>1/4/2011</a:t>
+              <a:t>1/11/2011</a:t>
             </a:fld>
             <a:endParaRPr lang="en-US" dirty="0"/>
           </a:p>
@@ -21047,7 +21376,7 @@
             <a:fld id="{1D8BD707-D9CF-40AE-B4C6-C98DA3205C09}" type="datetimeFigureOut">
               <a:rPr lang="en-US" smtClean="0"/>
               <a:pPr/>
-              <a:t>1/4/2011</a:t>
+              <a:t>1/11/2011</a:t>
             </a:fld>
             <a:endParaRPr lang="en-US" dirty="0"/>
           </a:p>
@@ -21297,7 +21626,7 @@
             <a:fld id="{1D8BD707-D9CF-40AE-B4C6-C98DA3205C09}" type="datetimeFigureOut">
               <a:rPr lang="en-US" smtClean="0"/>
               <a:pPr/>
-              <a:t>1/4/2011</a:t>
+              <a:t>1/11/2011</a:t>
             </a:fld>
             <a:endParaRPr lang="en-US" dirty="0"/>
           </a:p>
@@ -21507,7 +21836,7 @@
             <a:fld id="{1D8BD707-D9CF-40AE-B4C6-C98DA3205C09}" type="datetimeFigureOut">
               <a:rPr lang="en-US" smtClean="0"/>
               <a:pPr/>
-              <a:t>1/4/2011</a:t>
+              <a:t>1/11/2011</a:t>
             </a:fld>
             <a:endParaRPr lang="en-US" dirty="0"/>
           </a:p>

</xml_diff>